<commit_message>
added intelligent system slide.
</commit_message>
<xml_diff>
--- a/slides/02_agents.pptx
+++ b/slides/02_agents.pptx
@@ -5,7 +5,7 @@
     <p:sldMasterId id="2147483672" r:id="rId1"/>
   </p:sldMasterIdLst>
   <p:notesMasterIdLst>
-    <p:notesMasterId r:id="rId36"/>
+    <p:notesMasterId r:id="rId37"/>
   </p:notesMasterIdLst>
   <p:sldIdLst>
     <p:sldId id="257" r:id="rId2"/>
@@ -41,7 +41,8 @@
     <p:sldId id="296" r:id="rId32"/>
     <p:sldId id="304" r:id="rId33"/>
     <p:sldId id="298" r:id="rId34"/>
-    <p:sldId id="299" r:id="rId35"/>
+    <p:sldId id="313" r:id="rId35"/>
+    <p:sldId id="299" r:id="rId36"/>
   </p:sldIdLst>
   <p:sldSz cx="9144000" cy="6858000" type="screen4x3"/>
   <p:notesSz cx="7315200" cy="9601200"/>
@@ -3895,6 +3896,753 @@
 </file>
 
 <file path=ppt/diagrams/colors14.xml><?xml version="1.0" encoding="utf-8"?>
+<dgm:colorsDef xmlns:dgm="http://schemas.openxmlformats.org/drawingml/2006/diagram" xmlns:a="http://schemas.openxmlformats.org/drawingml/2006/main" uniqueId="urn:microsoft.com/office/officeart/2005/8/colors/accent1_2">
+  <dgm:title val=""/>
+  <dgm:desc val=""/>
+  <dgm:catLst>
+    <dgm:cat type="accent1" pri="11200"/>
+  </dgm:catLst>
+  <dgm:styleLbl name="node0">
+    <dgm:fillClrLst meth="repeat">
+      <a:schemeClr val="accent1"/>
+    </dgm:fillClrLst>
+    <dgm:linClrLst meth="repeat">
+      <a:schemeClr val="lt1"/>
+    </dgm:linClrLst>
+    <dgm:effectClrLst/>
+    <dgm:txLinClrLst/>
+    <dgm:txFillClrLst/>
+    <dgm:txEffectClrLst/>
+  </dgm:styleLbl>
+  <dgm:styleLbl name="alignNode1">
+    <dgm:fillClrLst meth="repeat">
+      <a:schemeClr val="accent1"/>
+    </dgm:fillClrLst>
+    <dgm:linClrLst meth="repeat">
+      <a:schemeClr val="accent1"/>
+    </dgm:linClrLst>
+    <dgm:effectClrLst/>
+    <dgm:txLinClrLst/>
+    <dgm:txFillClrLst/>
+    <dgm:txEffectClrLst/>
+  </dgm:styleLbl>
+  <dgm:styleLbl name="node1">
+    <dgm:fillClrLst meth="repeat">
+      <a:schemeClr val="accent1"/>
+    </dgm:fillClrLst>
+    <dgm:linClrLst meth="repeat">
+      <a:schemeClr val="lt1"/>
+    </dgm:linClrLst>
+    <dgm:effectClrLst/>
+    <dgm:txLinClrLst/>
+    <dgm:txFillClrLst/>
+    <dgm:txEffectClrLst/>
+  </dgm:styleLbl>
+  <dgm:styleLbl name="lnNode1">
+    <dgm:fillClrLst meth="repeat">
+      <a:schemeClr val="accent1"/>
+    </dgm:fillClrLst>
+    <dgm:linClrLst meth="repeat">
+      <a:schemeClr val="lt1"/>
+    </dgm:linClrLst>
+    <dgm:effectClrLst/>
+    <dgm:txLinClrLst/>
+    <dgm:txFillClrLst/>
+    <dgm:txEffectClrLst/>
+  </dgm:styleLbl>
+  <dgm:styleLbl name="vennNode1">
+    <dgm:fillClrLst meth="repeat">
+      <a:schemeClr val="accent1">
+        <a:alpha val="50000"/>
+      </a:schemeClr>
+    </dgm:fillClrLst>
+    <dgm:linClrLst meth="repeat">
+      <a:schemeClr val="lt1"/>
+    </dgm:linClrLst>
+    <dgm:effectClrLst/>
+    <dgm:txLinClrLst/>
+    <dgm:txFillClrLst/>
+    <dgm:txEffectClrLst/>
+  </dgm:styleLbl>
+  <dgm:styleLbl name="node2">
+    <dgm:fillClrLst meth="repeat">
+      <a:schemeClr val="accent1"/>
+    </dgm:fillClrLst>
+    <dgm:linClrLst meth="repeat">
+      <a:schemeClr val="lt1"/>
+    </dgm:linClrLst>
+    <dgm:effectClrLst/>
+    <dgm:txLinClrLst/>
+    <dgm:txFillClrLst/>
+    <dgm:txEffectClrLst/>
+  </dgm:styleLbl>
+  <dgm:styleLbl name="node3">
+    <dgm:fillClrLst meth="repeat">
+      <a:schemeClr val="accent1"/>
+    </dgm:fillClrLst>
+    <dgm:linClrLst meth="repeat">
+      <a:schemeClr val="lt1"/>
+    </dgm:linClrLst>
+    <dgm:effectClrLst/>
+    <dgm:txLinClrLst/>
+    <dgm:txFillClrLst/>
+    <dgm:txEffectClrLst/>
+  </dgm:styleLbl>
+  <dgm:styleLbl name="node4">
+    <dgm:fillClrLst meth="repeat">
+      <a:schemeClr val="accent1"/>
+    </dgm:fillClrLst>
+    <dgm:linClrLst meth="repeat">
+      <a:schemeClr val="lt1"/>
+    </dgm:linClrLst>
+    <dgm:effectClrLst/>
+    <dgm:txLinClrLst/>
+    <dgm:txFillClrLst/>
+    <dgm:txEffectClrLst/>
+  </dgm:styleLbl>
+  <dgm:styleLbl name="fgImgPlace1">
+    <dgm:fillClrLst meth="repeat">
+      <a:schemeClr val="accent1">
+        <a:tint val="50000"/>
+      </a:schemeClr>
+    </dgm:fillClrLst>
+    <dgm:linClrLst meth="repeat">
+      <a:schemeClr val="lt1"/>
+    </dgm:linClrLst>
+    <dgm:effectClrLst/>
+    <dgm:txLinClrLst/>
+    <dgm:txFillClrLst meth="repeat">
+      <a:schemeClr val="lt1"/>
+    </dgm:txFillClrLst>
+    <dgm:txEffectClrLst/>
+  </dgm:styleLbl>
+  <dgm:styleLbl name="alignImgPlace1">
+    <dgm:fillClrLst meth="repeat">
+      <a:schemeClr val="accent1">
+        <a:tint val="50000"/>
+      </a:schemeClr>
+    </dgm:fillClrLst>
+    <dgm:linClrLst meth="repeat">
+      <a:schemeClr val="lt1"/>
+    </dgm:linClrLst>
+    <dgm:effectClrLst/>
+    <dgm:txLinClrLst/>
+    <dgm:txFillClrLst meth="repeat">
+      <a:schemeClr val="lt1"/>
+    </dgm:txFillClrLst>
+    <dgm:txEffectClrLst/>
+  </dgm:styleLbl>
+  <dgm:styleLbl name="bgImgPlace1">
+    <dgm:fillClrLst meth="repeat">
+      <a:schemeClr val="accent1">
+        <a:tint val="50000"/>
+      </a:schemeClr>
+    </dgm:fillClrLst>
+    <dgm:linClrLst meth="repeat">
+      <a:schemeClr val="lt1"/>
+    </dgm:linClrLst>
+    <dgm:effectClrLst/>
+    <dgm:txLinClrLst/>
+    <dgm:txFillClrLst meth="repeat">
+      <a:schemeClr val="lt1"/>
+    </dgm:txFillClrLst>
+    <dgm:txEffectClrLst/>
+  </dgm:styleLbl>
+  <dgm:styleLbl name="sibTrans2D1">
+    <dgm:fillClrLst meth="repeat">
+      <a:schemeClr val="accent1">
+        <a:tint val="60000"/>
+      </a:schemeClr>
+    </dgm:fillClrLst>
+    <dgm:linClrLst meth="repeat">
+      <a:schemeClr val="accent1">
+        <a:tint val="60000"/>
+      </a:schemeClr>
+    </dgm:linClrLst>
+    <dgm:effectClrLst/>
+    <dgm:txLinClrLst/>
+    <dgm:txFillClrLst/>
+    <dgm:txEffectClrLst/>
+  </dgm:styleLbl>
+  <dgm:styleLbl name="fgSibTrans2D1">
+    <dgm:fillClrLst meth="repeat">
+      <a:schemeClr val="accent1">
+        <a:tint val="60000"/>
+      </a:schemeClr>
+    </dgm:fillClrLst>
+    <dgm:linClrLst meth="repeat">
+      <a:schemeClr val="accent1">
+        <a:tint val="60000"/>
+      </a:schemeClr>
+    </dgm:linClrLst>
+    <dgm:effectClrLst/>
+    <dgm:txLinClrLst/>
+    <dgm:txFillClrLst/>
+    <dgm:txEffectClrLst/>
+  </dgm:styleLbl>
+  <dgm:styleLbl name="bgSibTrans2D1">
+    <dgm:fillClrLst meth="repeat">
+      <a:schemeClr val="accent1">
+        <a:tint val="60000"/>
+      </a:schemeClr>
+    </dgm:fillClrLst>
+    <dgm:linClrLst meth="repeat">
+      <a:schemeClr val="accent1">
+        <a:tint val="60000"/>
+      </a:schemeClr>
+    </dgm:linClrLst>
+    <dgm:effectClrLst/>
+    <dgm:txLinClrLst/>
+    <dgm:txFillClrLst/>
+    <dgm:txEffectClrLst/>
+  </dgm:styleLbl>
+  <dgm:styleLbl name="sibTrans1D1">
+    <dgm:fillClrLst meth="repeat">
+      <a:schemeClr val="accent1"/>
+    </dgm:fillClrLst>
+    <dgm:linClrLst meth="repeat">
+      <a:schemeClr val="accent1"/>
+    </dgm:linClrLst>
+    <dgm:effectClrLst/>
+    <dgm:txLinClrLst/>
+    <dgm:txFillClrLst meth="repeat">
+      <a:schemeClr val="tx1"/>
+    </dgm:txFillClrLst>
+    <dgm:txEffectClrLst/>
+  </dgm:styleLbl>
+  <dgm:styleLbl name="callout">
+    <dgm:fillClrLst meth="repeat">
+      <a:schemeClr val="accent1"/>
+    </dgm:fillClrLst>
+    <dgm:linClrLst meth="repeat">
+      <a:schemeClr val="accent1">
+        <a:tint val="50000"/>
+      </a:schemeClr>
+    </dgm:linClrLst>
+    <dgm:effectClrLst/>
+    <dgm:txLinClrLst/>
+    <dgm:txFillClrLst meth="repeat">
+      <a:schemeClr val="tx1"/>
+    </dgm:txFillClrLst>
+    <dgm:txEffectClrLst/>
+  </dgm:styleLbl>
+  <dgm:styleLbl name="asst0">
+    <dgm:fillClrLst meth="repeat">
+      <a:schemeClr val="accent1"/>
+    </dgm:fillClrLst>
+    <dgm:linClrLst meth="repeat">
+      <a:schemeClr val="lt1"/>
+    </dgm:linClrLst>
+    <dgm:effectClrLst/>
+    <dgm:txLinClrLst/>
+    <dgm:txFillClrLst/>
+    <dgm:txEffectClrLst/>
+  </dgm:styleLbl>
+  <dgm:styleLbl name="asst1">
+    <dgm:fillClrLst meth="repeat">
+      <a:schemeClr val="accent1"/>
+    </dgm:fillClrLst>
+    <dgm:linClrLst meth="repeat">
+      <a:schemeClr val="lt1"/>
+    </dgm:linClrLst>
+    <dgm:effectClrLst/>
+    <dgm:txLinClrLst/>
+    <dgm:txFillClrLst/>
+    <dgm:txEffectClrLst/>
+  </dgm:styleLbl>
+  <dgm:styleLbl name="asst2">
+    <dgm:fillClrLst meth="repeat">
+      <a:schemeClr val="accent1"/>
+    </dgm:fillClrLst>
+    <dgm:linClrLst meth="repeat">
+      <a:schemeClr val="lt1"/>
+    </dgm:linClrLst>
+    <dgm:effectClrLst/>
+    <dgm:txLinClrLst/>
+    <dgm:txFillClrLst/>
+    <dgm:txEffectClrLst/>
+  </dgm:styleLbl>
+  <dgm:styleLbl name="asst3">
+    <dgm:fillClrLst meth="repeat">
+      <a:schemeClr val="accent1"/>
+    </dgm:fillClrLst>
+    <dgm:linClrLst meth="repeat">
+      <a:schemeClr val="lt1"/>
+    </dgm:linClrLst>
+    <dgm:effectClrLst/>
+    <dgm:txLinClrLst/>
+    <dgm:txFillClrLst/>
+    <dgm:txEffectClrLst/>
+  </dgm:styleLbl>
+  <dgm:styleLbl name="asst4">
+    <dgm:fillClrLst meth="repeat">
+      <a:schemeClr val="accent1"/>
+    </dgm:fillClrLst>
+    <dgm:linClrLst meth="repeat">
+      <a:schemeClr val="lt1"/>
+    </dgm:linClrLst>
+    <dgm:effectClrLst/>
+    <dgm:txLinClrLst/>
+    <dgm:txFillClrLst/>
+    <dgm:txEffectClrLst/>
+  </dgm:styleLbl>
+  <dgm:styleLbl name="parChTrans2D1">
+    <dgm:fillClrLst meth="repeat">
+      <a:schemeClr val="accent1">
+        <a:tint val="60000"/>
+      </a:schemeClr>
+    </dgm:fillClrLst>
+    <dgm:linClrLst meth="repeat">
+      <a:schemeClr val="accent1">
+        <a:tint val="60000"/>
+      </a:schemeClr>
+    </dgm:linClrLst>
+    <dgm:effectClrLst/>
+    <dgm:txLinClrLst/>
+    <dgm:txFillClrLst meth="repeat">
+      <a:schemeClr val="lt1"/>
+    </dgm:txFillClrLst>
+    <dgm:txEffectClrLst/>
+  </dgm:styleLbl>
+  <dgm:styleLbl name="parChTrans2D2">
+    <dgm:fillClrLst meth="repeat">
+      <a:schemeClr val="accent1"/>
+    </dgm:fillClrLst>
+    <dgm:linClrLst meth="repeat">
+      <a:schemeClr val="accent1"/>
+    </dgm:linClrLst>
+    <dgm:effectClrLst/>
+    <dgm:txLinClrLst/>
+    <dgm:txFillClrLst meth="repeat">
+      <a:schemeClr val="lt1"/>
+    </dgm:txFillClrLst>
+    <dgm:txEffectClrLst/>
+  </dgm:styleLbl>
+  <dgm:styleLbl name="parChTrans2D3">
+    <dgm:fillClrLst meth="repeat">
+      <a:schemeClr val="accent1"/>
+    </dgm:fillClrLst>
+    <dgm:linClrLst meth="repeat">
+      <a:schemeClr val="accent1"/>
+    </dgm:linClrLst>
+    <dgm:effectClrLst/>
+    <dgm:txLinClrLst/>
+    <dgm:txFillClrLst meth="repeat">
+      <a:schemeClr val="lt1"/>
+    </dgm:txFillClrLst>
+    <dgm:txEffectClrLst/>
+  </dgm:styleLbl>
+  <dgm:styleLbl name="parChTrans2D4">
+    <dgm:fillClrLst meth="repeat">
+      <a:schemeClr val="accent1"/>
+    </dgm:fillClrLst>
+    <dgm:linClrLst meth="repeat">
+      <a:schemeClr val="accent1"/>
+    </dgm:linClrLst>
+    <dgm:effectClrLst/>
+    <dgm:txLinClrLst/>
+    <dgm:txFillClrLst meth="repeat">
+      <a:schemeClr val="lt1"/>
+    </dgm:txFillClrLst>
+    <dgm:txEffectClrLst/>
+  </dgm:styleLbl>
+  <dgm:styleLbl name="parChTrans1D1">
+    <dgm:fillClrLst meth="repeat">
+      <a:schemeClr val="accent1"/>
+    </dgm:fillClrLst>
+    <dgm:linClrLst meth="repeat">
+      <a:schemeClr val="accent1">
+        <a:shade val="60000"/>
+      </a:schemeClr>
+    </dgm:linClrLst>
+    <dgm:effectClrLst/>
+    <dgm:txLinClrLst/>
+    <dgm:txFillClrLst meth="repeat">
+      <a:schemeClr val="tx1"/>
+    </dgm:txFillClrLst>
+    <dgm:txEffectClrLst/>
+  </dgm:styleLbl>
+  <dgm:styleLbl name="parChTrans1D2">
+    <dgm:fillClrLst meth="repeat">
+      <a:schemeClr val="accent1"/>
+    </dgm:fillClrLst>
+    <dgm:linClrLst meth="repeat">
+      <a:schemeClr val="accent1">
+        <a:shade val="60000"/>
+      </a:schemeClr>
+    </dgm:linClrLst>
+    <dgm:effectClrLst/>
+    <dgm:txLinClrLst/>
+    <dgm:txFillClrLst meth="repeat">
+      <a:schemeClr val="tx1"/>
+    </dgm:txFillClrLst>
+    <dgm:txEffectClrLst/>
+  </dgm:styleLbl>
+  <dgm:styleLbl name="parChTrans1D3">
+    <dgm:fillClrLst meth="repeat">
+      <a:schemeClr val="accent1"/>
+    </dgm:fillClrLst>
+    <dgm:linClrLst meth="repeat">
+      <a:schemeClr val="accent1">
+        <a:shade val="80000"/>
+      </a:schemeClr>
+    </dgm:linClrLst>
+    <dgm:effectClrLst/>
+    <dgm:txLinClrLst/>
+    <dgm:txFillClrLst meth="repeat">
+      <a:schemeClr val="tx1"/>
+    </dgm:txFillClrLst>
+    <dgm:txEffectClrLst/>
+  </dgm:styleLbl>
+  <dgm:styleLbl name="parChTrans1D4">
+    <dgm:fillClrLst meth="repeat">
+      <a:schemeClr val="accent1"/>
+    </dgm:fillClrLst>
+    <dgm:linClrLst meth="repeat">
+      <a:schemeClr val="accent1">
+        <a:shade val="80000"/>
+      </a:schemeClr>
+    </dgm:linClrLst>
+    <dgm:effectClrLst/>
+    <dgm:txLinClrLst/>
+    <dgm:txFillClrLst meth="repeat">
+      <a:schemeClr val="tx1"/>
+    </dgm:txFillClrLst>
+    <dgm:txEffectClrLst/>
+  </dgm:styleLbl>
+  <dgm:styleLbl name="fgAcc1">
+    <dgm:fillClrLst meth="repeat">
+      <a:schemeClr val="lt1">
+        <a:alpha val="90000"/>
+      </a:schemeClr>
+    </dgm:fillClrLst>
+    <dgm:linClrLst meth="repeat">
+      <a:schemeClr val="accent1"/>
+    </dgm:linClrLst>
+    <dgm:effectClrLst/>
+    <dgm:txLinClrLst/>
+    <dgm:txFillClrLst meth="repeat">
+      <a:schemeClr val="dk1"/>
+    </dgm:txFillClrLst>
+    <dgm:txEffectClrLst/>
+  </dgm:styleLbl>
+  <dgm:styleLbl name="conFgAcc1">
+    <dgm:fillClrLst meth="repeat">
+      <a:schemeClr val="lt1">
+        <a:alpha val="90000"/>
+      </a:schemeClr>
+    </dgm:fillClrLst>
+    <dgm:linClrLst meth="repeat">
+      <a:schemeClr val="accent1"/>
+    </dgm:linClrLst>
+    <dgm:effectClrLst/>
+    <dgm:txLinClrLst/>
+    <dgm:txFillClrLst meth="repeat">
+      <a:schemeClr val="dk1"/>
+    </dgm:txFillClrLst>
+    <dgm:txEffectClrLst/>
+  </dgm:styleLbl>
+  <dgm:styleLbl name="alignAcc1">
+    <dgm:fillClrLst meth="repeat">
+      <a:schemeClr val="lt1">
+        <a:alpha val="90000"/>
+      </a:schemeClr>
+    </dgm:fillClrLst>
+    <dgm:linClrLst meth="repeat">
+      <a:schemeClr val="accent1"/>
+    </dgm:linClrLst>
+    <dgm:effectClrLst/>
+    <dgm:txLinClrLst/>
+    <dgm:txFillClrLst meth="repeat">
+      <a:schemeClr val="dk1"/>
+    </dgm:txFillClrLst>
+    <dgm:txEffectClrLst/>
+  </dgm:styleLbl>
+  <dgm:styleLbl name="trAlignAcc1">
+    <dgm:fillClrLst meth="repeat">
+      <a:schemeClr val="lt1">
+        <a:alpha val="40000"/>
+      </a:schemeClr>
+    </dgm:fillClrLst>
+    <dgm:linClrLst meth="repeat">
+      <a:schemeClr val="accent1"/>
+    </dgm:linClrLst>
+    <dgm:effectClrLst/>
+    <dgm:txLinClrLst/>
+    <dgm:txFillClrLst meth="repeat">
+      <a:schemeClr val="dk1"/>
+    </dgm:txFillClrLst>
+    <dgm:txEffectClrLst/>
+  </dgm:styleLbl>
+  <dgm:styleLbl name="bgAcc1">
+    <dgm:fillClrLst meth="repeat">
+      <a:schemeClr val="lt1">
+        <a:alpha val="90000"/>
+      </a:schemeClr>
+    </dgm:fillClrLst>
+    <dgm:linClrLst meth="repeat">
+      <a:schemeClr val="accent1"/>
+    </dgm:linClrLst>
+    <dgm:effectClrLst/>
+    <dgm:txLinClrLst/>
+    <dgm:txFillClrLst meth="repeat">
+      <a:schemeClr val="dk1"/>
+    </dgm:txFillClrLst>
+    <dgm:txEffectClrLst/>
+  </dgm:styleLbl>
+  <dgm:styleLbl name="solidFgAcc1">
+    <dgm:fillClrLst meth="repeat">
+      <a:schemeClr val="lt1"/>
+    </dgm:fillClrLst>
+    <dgm:linClrLst meth="repeat">
+      <a:schemeClr val="accent1"/>
+    </dgm:linClrLst>
+    <dgm:effectClrLst/>
+    <dgm:txLinClrLst/>
+    <dgm:txFillClrLst meth="repeat">
+      <a:schemeClr val="dk1"/>
+    </dgm:txFillClrLst>
+    <dgm:txEffectClrLst/>
+  </dgm:styleLbl>
+  <dgm:styleLbl name="solidAlignAcc1">
+    <dgm:fillClrLst meth="repeat">
+      <a:schemeClr val="lt1"/>
+    </dgm:fillClrLst>
+    <dgm:linClrLst meth="repeat">
+      <a:schemeClr val="accent1"/>
+    </dgm:linClrLst>
+    <dgm:effectClrLst/>
+    <dgm:txLinClrLst/>
+    <dgm:txFillClrLst meth="repeat">
+      <a:schemeClr val="dk1"/>
+    </dgm:txFillClrLst>
+    <dgm:txEffectClrLst/>
+  </dgm:styleLbl>
+  <dgm:styleLbl name="solidBgAcc1">
+    <dgm:fillClrLst meth="repeat">
+      <a:schemeClr val="lt1"/>
+    </dgm:fillClrLst>
+    <dgm:linClrLst meth="repeat">
+      <a:schemeClr val="accent1"/>
+    </dgm:linClrLst>
+    <dgm:effectClrLst/>
+    <dgm:txLinClrLst/>
+    <dgm:txFillClrLst meth="repeat">
+      <a:schemeClr val="dk1"/>
+    </dgm:txFillClrLst>
+    <dgm:txEffectClrLst/>
+  </dgm:styleLbl>
+  <dgm:styleLbl name="fgAccFollowNode1">
+    <dgm:fillClrLst meth="repeat">
+      <a:schemeClr val="accent1">
+        <a:alpha val="90000"/>
+        <a:tint val="40000"/>
+      </a:schemeClr>
+    </dgm:fillClrLst>
+    <dgm:linClrLst meth="repeat">
+      <a:schemeClr val="accent1">
+        <a:alpha val="90000"/>
+        <a:tint val="40000"/>
+      </a:schemeClr>
+    </dgm:linClrLst>
+    <dgm:effectClrLst/>
+    <dgm:txLinClrLst/>
+    <dgm:txFillClrLst meth="repeat">
+      <a:schemeClr val="dk1"/>
+    </dgm:txFillClrLst>
+    <dgm:txEffectClrLst/>
+  </dgm:styleLbl>
+  <dgm:styleLbl name="alignAccFollowNode1">
+    <dgm:fillClrLst meth="repeat">
+      <a:schemeClr val="accent1">
+        <a:alpha val="90000"/>
+        <a:tint val="40000"/>
+      </a:schemeClr>
+    </dgm:fillClrLst>
+    <dgm:linClrLst meth="repeat">
+      <a:schemeClr val="accent1">
+        <a:alpha val="90000"/>
+        <a:tint val="40000"/>
+      </a:schemeClr>
+    </dgm:linClrLst>
+    <dgm:effectClrLst/>
+    <dgm:txLinClrLst/>
+    <dgm:txFillClrLst meth="repeat">
+      <a:schemeClr val="dk1"/>
+    </dgm:txFillClrLst>
+    <dgm:txEffectClrLst/>
+  </dgm:styleLbl>
+  <dgm:styleLbl name="bgAccFollowNode1">
+    <dgm:fillClrLst meth="repeat">
+      <a:schemeClr val="accent1">
+        <a:alpha val="90000"/>
+        <a:tint val="40000"/>
+      </a:schemeClr>
+    </dgm:fillClrLst>
+    <dgm:linClrLst meth="repeat">
+      <a:schemeClr val="accent1">
+        <a:alpha val="90000"/>
+        <a:tint val="40000"/>
+      </a:schemeClr>
+    </dgm:linClrLst>
+    <dgm:effectClrLst/>
+    <dgm:txLinClrLst/>
+    <dgm:txFillClrLst meth="repeat">
+      <a:schemeClr val="dk1"/>
+    </dgm:txFillClrLst>
+    <dgm:txEffectClrLst/>
+  </dgm:styleLbl>
+  <dgm:styleLbl name="fgAcc0">
+    <dgm:fillClrLst meth="repeat">
+      <a:schemeClr val="lt1">
+        <a:alpha val="90000"/>
+      </a:schemeClr>
+    </dgm:fillClrLst>
+    <dgm:linClrLst meth="repeat">
+      <a:schemeClr val="accent1"/>
+    </dgm:linClrLst>
+    <dgm:effectClrLst/>
+    <dgm:txLinClrLst/>
+    <dgm:txFillClrLst meth="repeat">
+      <a:schemeClr val="dk1"/>
+    </dgm:txFillClrLst>
+    <dgm:txEffectClrLst/>
+  </dgm:styleLbl>
+  <dgm:styleLbl name="fgAcc2">
+    <dgm:fillClrLst meth="repeat">
+      <a:schemeClr val="lt1">
+        <a:alpha val="90000"/>
+      </a:schemeClr>
+    </dgm:fillClrLst>
+    <dgm:linClrLst meth="repeat">
+      <a:schemeClr val="accent1"/>
+    </dgm:linClrLst>
+    <dgm:effectClrLst/>
+    <dgm:txLinClrLst/>
+    <dgm:txFillClrLst meth="repeat">
+      <a:schemeClr val="dk1"/>
+    </dgm:txFillClrLst>
+    <dgm:txEffectClrLst/>
+  </dgm:styleLbl>
+  <dgm:styleLbl name="fgAcc3">
+    <dgm:fillClrLst meth="repeat">
+      <a:schemeClr val="lt1">
+        <a:alpha val="90000"/>
+      </a:schemeClr>
+    </dgm:fillClrLst>
+    <dgm:linClrLst meth="repeat">
+      <a:schemeClr val="accent1"/>
+    </dgm:linClrLst>
+    <dgm:effectClrLst/>
+    <dgm:txLinClrLst/>
+    <dgm:txFillClrLst meth="repeat">
+      <a:schemeClr val="dk1"/>
+    </dgm:txFillClrLst>
+    <dgm:txEffectClrLst/>
+  </dgm:styleLbl>
+  <dgm:styleLbl name="fgAcc4">
+    <dgm:fillClrLst meth="repeat">
+      <a:schemeClr val="lt1">
+        <a:alpha val="90000"/>
+      </a:schemeClr>
+    </dgm:fillClrLst>
+    <dgm:linClrLst meth="repeat">
+      <a:schemeClr val="accent1"/>
+    </dgm:linClrLst>
+    <dgm:effectClrLst/>
+    <dgm:txLinClrLst/>
+    <dgm:txFillClrLst meth="repeat">
+      <a:schemeClr val="dk1"/>
+    </dgm:txFillClrLst>
+    <dgm:txEffectClrLst/>
+  </dgm:styleLbl>
+  <dgm:styleLbl name="bgShp">
+    <dgm:fillClrLst meth="repeat">
+      <a:schemeClr val="accent1">
+        <a:tint val="40000"/>
+      </a:schemeClr>
+    </dgm:fillClrLst>
+    <dgm:linClrLst meth="repeat">
+      <a:schemeClr val="accent1"/>
+    </dgm:linClrLst>
+    <dgm:effectClrLst/>
+    <dgm:txLinClrLst/>
+    <dgm:txFillClrLst meth="repeat">
+      <a:schemeClr val="dk1"/>
+    </dgm:txFillClrLst>
+    <dgm:txEffectClrLst/>
+  </dgm:styleLbl>
+  <dgm:styleLbl name="dkBgShp">
+    <dgm:fillClrLst meth="repeat">
+      <a:schemeClr val="accent1">
+        <a:shade val="80000"/>
+      </a:schemeClr>
+    </dgm:fillClrLst>
+    <dgm:linClrLst meth="repeat">
+      <a:schemeClr val="accent1"/>
+    </dgm:linClrLst>
+    <dgm:effectClrLst/>
+    <dgm:txLinClrLst/>
+    <dgm:txFillClrLst meth="repeat">
+      <a:schemeClr val="lt1"/>
+    </dgm:txFillClrLst>
+    <dgm:txEffectClrLst/>
+  </dgm:styleLbl>
+  <dgm:styleLbl name="trBgShp">
+    <dgm:fillClrLst meth="repeat">
+      <a:schemeClr val="accent1">
+        <a:tint val="50000"/>
+        <a:alpha val="40000"/>
+      </a:schemeClr>
+    </dgm:fillClrLst>
+    <dgm:linClrLst meth="repeat">
+      <a:schemeClr val="accent1"/>
+    </dgm:linClrLst>
+    <dgm:effectClrLst/>
+    <dgm:txLinClrLst/>
+    <dgm:txFillClrLst meth="repeat">
+      <a:schemeClr val="lt1"/>
+    </dgm:txFillClrLst>
+    <dgm:txEffectClrLst/>
+  </dgm:styleLbl>
+  <dgm:styleLbl name="fgShp">
+    <dgm:fillClrLst meth="repeat">
+      <a:schemeClr val="accent1">
+        <a:tint val="60000"/>
+      </a:schemeClr>
+    </dgm:fillClrLst>
+    <dgm:linClrLst meth="repeat">
+      <a:schemeClr val="lt1"/>
+    </dgm:linClrLst>
+    <dgm:effectClrLst/>
+    <dgm:txLinClrLst/>
+    <dgm:txFillClrLst meth="repeat">
+      <a:schemeClr val="dk1"/>
+    </dgm:txFillClrLst>
+    <dgm:txEffectClrLst/>
+  </dgm:styleLbl>
+  <dgm:styleLbl name="revTx">
+    <dgm:fillClrLst meth="repeat">
+      <a:schemeClr val="lt1">
+        <a:alpha val="0"/>
+      </a:schemeClr>
+    </dgm:fillClrLst>
+    <dgm:linClrLst meth="repeat">
+      <a:schemeClr val="dk1">
+        <a:alpha val="0"/>
+      </a:schemeClr>
+    </dgm:linClrLst>
+    <dgm:effectClrLst/>
+    <dgm:txLinClrLst/>
+    <dgm:txFillClrLst meth="repeat">
+      <a:schemeClr val="tx1"/>
+    </dgm:txFillClrLst>
+    <dgm:txEffectClrLst/>
+  </dgm:styleLbl>
+</dgm:colorsDef>
+</file>
+
+<file path=ppt/diagrams/colors15.xml><?xml version="1.0" encoding="utf-8"?>
 <dgm:colorsDef xmlns:dgm="http://schemas.openxmlformats.org/drawingml/2006/diagram" xmlns:a="http://schemas.openxmlformats.org/drawingml/2006/main" uniqueId="urn:microsoft.com/office/officeart/2005/8/colors/colorful1">
   <dgm:title val=""/>
   <dgm:desc val=""/>
@@ -13429,6 +14177,262 @@
 </file>
 
 <file path=ppt/diagrams/data14.xml><?xml version="1.0" encoding="utf-8"?>
+<dgm:dataModel xmlns:dgm="http://schemas.openxmlformats.org/drawingml/2006/diagram" xmlns:a="http://schemas.openxmlformats.org/drawingml/2006/main">
+  <dgm:ptLst>
+    <dgm:pt modelId="{39AFE723-49AB-449E-B50F-EA8C2BF37A40}" type="doc">
+      <dgm:prSet loTypeId="urn:microsoft.com/office/officeart/2005/8/layout/pyramid2" loCatId="pyramid" qsTypeId="urn:microsoft.com/office/officeart/2005/8/quickstyle/simple5" qsCatId="simple" csTypeId="urn:microsoft.com/office/officeart/2005/8/colors/accent1_2" csCatId="accent1" phldr="1"/>
+      <dgm:spPr/>
+      <dgm:t>
+        <a:bodyPr/>
+        <a:lstStyle/>
+        <a:p>
+          <a:endParaRPr lang="en-US"/>
+        </a:p>
+      </dgm:t>
+    </dgm:pt>
+    <dgm:pt modelId="{A0E3FCFC-BB2B-4439-83FF-36BF448BD06A}">
+      <dgm:prSet/>
+      <dgm:spPr/>
+      <dgm:t>
+        <a:bodyPr/>
+        <a:lstStyle/>
+        <a:p>
+          <a:r>
+            <a:rPr lang="en-US" dirty="0"/>
+            <a:t>Utility-based agents</a:t>
+          </a:r>
+        </a:p>
+      </dgm:t>
+    </dgm:pt>
+    <dgm:pt modelId="{766B9DF4-1C2B-47FF-8B2C-C87F104DADB1}" type="parTrans" cxnId="{5D1D656F-442B-41DC-B5FB-EC817B242166}">
+      <dgm:prSet/>
+      <dgm:spPr/>
+      <dgm:t>
+        <a:bodyPr/>
+        <a:lstStyle/>
+        <a:p>
+          <a:endParaRPr lang="en-US"/>
+        </a:p>
+      </dgm:t>
+    </dgm:pt>
+    <dgm:pt modelId="{B179EBFF-74FB-4F9A-8211-FCA2E7054372}" type="sibTrans" cxnId="{5D1D656F-442B-41DC-B5FB-EC817B242166}">
+      <dgm:prSet/>
+      <dgm:spPr/>
+      <dgm:t>
+        <a:bodyPr/>
+        <a:lstStyle/>
+        <a:p>
+          <a:endParaRPr lang="en-US"/>
+        </a:p>
+      </dgm:t>
+    </dgm:pt>
+    <dgm:pt modelId="{83B41E69-333C-420C-BE24-7412C78078A0}">
+      <dgm:prSet/>
+      <dgm:spPr/>
+      <dgm:t>
+        <a:bodyPr/>
+        <a:lstStyle/>
+        <a:p>
+          <a:r>
+            <a:rPr lang="en-US" dirty="0"/>
+            <a:t>Simple reflex agents</a:t>
+          </a:r>
+        </a:p>
+      </dgm:t>
+    </dgm:pt>
+    <dgm:pt modelId="{CD0808E1-62F1-42F3-B0B9-76A7FF862A23}" type="parTrans" cxnId="{AABD6FDE-5BBB-469A-864E-D15AACD350E8}">
+      <dgm:prSet/>
+      <dgm:spPr/>
+      <dgm:t>
+        <a:bodyPr/>
+        <a:lstStyle/>
+        <a:p>
+          <a:endParaRPr lang="en-US"/>
+        </a:p>
+      </dgm:t>
+    </dgm:pt>
+    <dgm:pt modelId="{B97B47CC-D836-4357-8FE0-0228F8261E47}" type="sibTrans" cxnId="{AABD6FDE-5BBB-469A-864E-D15AACD350E8}">
+      <dgm:prSet/>
+      <dgm:spPr/>
+      <dgm:t>
+        <a:bodyPr/>
+        <a:lstStyle/>
+        <a:p>
+          <a:endParaRPr lang="en-US"/>
+        </a:p>
+      </dgm:t>
+    </dgm:pt>
+    <dgm:pt modelId="{A961D3C2-FCC5-41AA-942B-B9A11E84A7FC}">
+      <dgm:prSet/>
+      <dgm:spPr/>
+      <dgm:t>
+        <a:bodyPr/>
+        <a:lstStyle/>
+        <a:p>
+          <a:r>
+            <a:rPr lang="en-US" dirty="0"/>
+            <a:t>Goal-based agents</a:t>
+          </a:r>
+        </a:p>
+      </dgm:t>
+    </dgm:pt>
+    <dgm:pt modelId="{43381F9A-2939-4072-9FE0-CC4B57BCCDB3}" type="parTrans" cxnId="{6B42274A-1F6A-4F30-ABF9-F9E1D521E09C}">
+      <dgm:prSet/>
+      <dgm:spPr/>
+      <dgm:t>
+        <a:bodyPr/>
+        <a:lstStyle/>
+        <a:p>
+          <a:endParaRPr lang="en-US"/>
+        </a:p>
+      </dgm:t>
+    </dgm:pt>
+    <dgm:pt modelId="{DF69E99E-2046-4701-93B5-B7A014CC0A99}" type="sibTrans" cxnId="{6B42274A-1F6A-4F30-ABF9-F9E1D521E09C}">
+      <dgm:prSet/>
+      <dgm:spPr/>
+      <dgm:t>
+        <a:bodyPr/>
+        <a:lstStyle/>
+        <a:p>
+          <a:endParaRPr lang="en-US"/>
+        </a:p>
+      </dgm:t>
+    </dgm:pt>
+    <dgm:pt modelId="{3FA1C433-C911-46BA-A591-2B3A5AF1361F}">
+      <dgm:prSet/>
+      <dgm:spPr/>
+      <dgm:t>
+        <a:bodyPr/>
+        <a:lstStyle/>
+        <a:p>
+          <a:r>
+            <a:rPr lang="en-US"/>
+            <a:t>Model-based reflex agents</a:t>
+          </a:r>
+          <a:endParaRPr lang="en-US" dirty="0"/>
+        </a:p>
+      </dgm:t>
+    </dgm:pt>
+    <dgm:pt modelId="{2BBFE6E3-37F8-4618-9894-6A0583820894}" type="parTrans" cxnId="{8DD365E2-3BE6-4CF1-833F-42E307DFC473}">
+      <dgm:prSet/>
+      <dgm:spPr/>
+      <dgm:t>
+        <a:bodyPr/>
+        <a:lstStyle/>
+        <a:p>
+          <a:endParaRPr lang="en-US"/>
+        </a:p>
+      </dgm:t>
+    </dgm:pt>
+    <dgm:pt modelId="{9ECBCE8D-FE96-44B5-9DED-E937F9C00A0A}" type="sibTrans" cxnId="{8DD365E2-3BE6-4CF1-833F-42E307DFC473}">
+      <dgm:prSet/>
+      <dgm:spPr/>
+      <dgm:t>
+        <a:bodyPr/>
+        <a:lstStyle/>
+        <a:p>
+          <a:endParaRPr lang="en-US"/>
+        </a:p>
+      </dgm:t>
+    </dgm:pt>
+    <dgm:pt modelId="{8E76272A-CE3E-4D12-B983-8FB136F6A52B}" type="pres">
+      <dgm:prSet presAssocID="{39AFE723-49AB-449E-B50F-EA8C2BF37A40}" presName="compositeShape" presStyleCnt="0">
+        <dgm:presLayoutVars>
+          <dgm:dir/>
+          <dgm:resizeHandles/>
+        </dgm:presLayoutVars>
+      </dgm:prSet>
+      <dgm:spPr/>
+    </dgm:pt>
+    <dgm:pt modelId="{421772EB-A28C-4249-9248-E9285A7294E2}" type="pres">
+      <dgm:prSet presAssocID="{39AFE723-49AB-449E-B50F-EA8C2BF37A40}" presName="pyramid" presStyleLbl="node1" presStyleIdx="0" presStyleCnt="1" custAng="10800000" custLinFactNeighborX="-33562"/>
+      <dgm:spPr/>
+    </dgm:pt>
+    <dgm:pt modelId="{67A66B3D-BAEA-4734-81A4-3FA61A2837F6}" type="pres">
+      <dgm:prSet presAssocID="{39AFE723-49AB-449E-B50F-EA8C2BF37A40}" presName="theList" presStyleCnt="0"/>
+      <dgm:spPr/>
+    </dgm:pt>
+    <dgm:pt modelId="{128154D5-B7B6-4090-B776-DC63838EC167}" type="pres">
+      <dgm:prSet presAssocID="{A0E3FCFC-BB2B-4439-83FF-36BF448BD06A}" presName="aNode" presStyleLbl="fgAcc1" presStyleIdx="0" presStyleCnt="4" custLinFactNeighborX="-68069">
+        <dgm:presLayoutVars>
+          <dgm:bulletEnabled val="1"/>
+        </dgm:presLayoutVars>
+      </dgm:prSet>
+      <dgm:spPr/>
+    </dgm:pt>
+    <dgm:pt modelId="{5956F3D9-764E-468B-BBEC-69595642B66D}" type="pres">
+      <dgm:prSet presAssocID="{A0E3FCFC-BB2B-4439-83FF-36BF448BD06A}" presName="aSpace" presStyleCnt="0"/>
+      <dgm:spPr/>
+    </dgm:pt>
+    <dgm:pt modelId="{E9E54B10-0E80-4EC7-BDC9-1B1E1CD3F5FC}" type="pres">
+      <dgm:prSet presAssocID="{A961D3C2-FCC5-41AA-942B-B9A11E84A7FC}" presName="aNode" presStyleLbl="fgAcc1" presStyleIdx="1" presStyleCnt="4" custLinFactNeighborX="-68069">
+        <dgm:presLayoutVars>
+          <dgm:bulletEnabled val="1"/>
+        </dgm:presLayoutVars>
+      </dgm:prSet>
+      <dgm:spPr/>
+    </dgm:pt>
+    <dgm:pt modelId="{2533FDDA-1140-4423-8215-A249C25D2753}" type="pres">
+      <dgm:prSet presAssocID="{A961D3C2-FCC5-41AA-942B-B9A11E84A7FC}" presName="aSpace" presStyleCnt="0"/>
+      <dgm:spPr/>
+    </dgm:pt>
+    <dgm:pt modelId="{B5BCA4F7-7F6F-43C2-84D5-1C28E4BBCA24}" type="pres">
+      <dgm:prSet presAssocID="{3FA1C433-C911-46BA-A591-2B3A5AF1361F}" presName="aNode" presStyleLbl="fgAcc1" presStyleIdx="2" presStyleCnt="4" custLinFactNeighborX="-68069">
+        <dgm:presLayoutVars>
+          <dgm:bulletEnabled val="1"/>
+        </dgm:presLayoutVars>
+      </dgm:prSet>
+      <dgm:spPr/>
+    </dgm:pt>
+    <dgm:pt modelId="{53133F68-D5DF-411C-9C30-07A43607D1F3}" type="pres">
+      <dgm:prSet presAssocID="{3FA1C433-C911-46BA-A591-2B3A5AF1361F}" presName="aSpace" presStyleCnt="0"/>
+      <dgm:spPr/>
+    </dgm:pt>
+    <dgm:pt modelId="{54EC23F3-F115-4CD3-9500-0768D2AE6E17}" type="pres">
+      <dgm:prSet presAssocID="{83B41E69-333C-420C-BE24-7412C78078A0}" presName="aNode" presStyleLbl="fgAcc1" presStyleIdx="3" presStyleCnt="4" custLinFactNeighborX="-68069">
+        <dgm:presLayoutVars>
+          <dgm:bulletEnabled val="1"/>
+        </dgm:presLayoutVars>
+      </dgm:prSet>
+      <dgm:spPr/>
+    </dgm:pt>
+    <dgm:pt modelId="{6655755C-E94F-4B60-8554-ED3FF4C2751D}" type="pres">
+      <dgm:prSet presAssocID="{83B41E69-333C-420C-BE24-7412C78078A0}" presName="aSpace" presStyleCnt="0"/>
+      <dgm:spPr/>
+    </dgm:pt>
+  </dgm:ptLst>
+  <dgm:cxnLst>
+    <dgm:cxn modelId="{BF411309-3728-401B-B2E2-18B9E61AD4AC}" type="presOf" srcId="{39AFE723-49AB-449E-B50F-EA8C2BF37A40}" destId="{8E76272A-CE3E-4D12-B983-8FB136F6A52B}" srcOrd="0" destOrd="0" presId="urn:microsoft.com/office/officeart/2005/8/layout/pyramid2"/>
+    <dgm:cxn modelId="{920EA31B-541E-49E6-809A-BCBB111A1103}" type="presOf" srcId="{A0E3FCFC-BB2B-4439-83FF-36BF448BD06A}" destId="{128154D5-B7B6-4090-B776-DC63838EC167}" srcOrd="0" destOrd="0" presId="urn:microsoft.com/office/officeart/2005/8/layout/pyramid2"/>
+    <dgm:cxn modelId="{434AD221-AB5B-46B2-99A0-00E3ECBF59EE}" type="presOf" srcId="{A961D3C2-FCC5-41AA-942B-B9A11E84A7FC}" destId="{E9E54B10-0E80-4EC7-BDC9-1B1E1CD3F5FC}" srcOrd="0" destOrd="0" presId="urn:microsoft.com/office/officeart/2005/8/layout/pyramid2"/>
+    <dgm:cxn modelId="{6B42274A-1F6A-4F30-ABF9-F9E1D521E09C}" srcId="{39AFE723-49AB-449E-B50F-EA8C2BF37A40}" destId="{A961D3C2-FCC5-41AA-942B-B9A11E84A7FC}" srcOrd="1" destOrd="0" parTransId="{43381F9A-2939-4072-9FE0-CC4B57BCCDB3}" sibTransId="{DF69E99E-2046-4701-93B5-B7A014CC0A99}"/>
+    <dgm:cxn modelId="{2EE2DC6A-1EE2-4C45-84DD-742A29B2986D}" type="presOf" srcId="{3FA1C433-C911-46BA-A591-2B3A5AF1361F}" destId="{B5BCA4F7-7F6F-43C2-84D5-1C28E4BBCA24}" srcOrd="0" destOrd="0" presId="urn:microsoft.com/office/officeart/2005/8/layout/pyramid2"/>
+    <dgm:cxn modelId="{5D1D656F-442B-41DC-B5FB-EC817B242166}" srcId="{39AFE723-49AB-449E-B50F-EA8C2BF37A40}" destId="{A0E3FCFC-BB2B-4439-83FF-36BF448BD06A}" srcOrd="0" destOrd="0" parTransId="{766B9DF4-1C2B-47FF-8B2C-C87F104DADB1}" sibTransId="{B179EBFF-74FB-4F9A-8211-FCA2E7054372}"/>
+    <dgm:cxn modelId="{93D348BB-E399-4FB3-8121-AADDE2F2F3BC}" type="presOf" srcId="{83B41E69-333C-420C-BE24-7412C78078A0}" destId="{54EC23F3-F115-4CD3-9500-0768D2AE6E17}" srcOrd="0" destOrd="0" presId="urn:microsoft.com/office/officeart/2005/8/layout/pyramid2"/>
+    <dgm:cxn modelId="{AABD6FDE-5BBB-469A-864E-D15AACD350E8}" srcId="{39AFE723-49AB-449E-B50F-EA8C2BF37A40}" destId="{83B41E69-333C-420C-BE24-7412C78078A0}" srcOrd="3" destOrd="0" parTransId="{CD0808E1-62F1-42F3-B0B9-76A7FF862A23}" sibTransId="{B97B47CC-D836-4357-8FE0-0228F8261E47}"/>
+    <dgm:cxn modelId="{8DD365E2-3BE6-4CF1-833F-42E307DFC473}" srcId="{39AFE723-49AB-449E-B50F-EA8C2BF37A40}" destId="{3FA1C433-C911-46BA-A591-2B3A5AF1361F}" srcOrd="2" destOrd="0" parTransId="{2BBFE6E3-37F8-4618-9894-6A0583820894}" sibTransId="{9ECBCE8D-FE96-44B5-9DED-E937F9C00A0A}"/>
+    <dgm:cxn modelId="{CE4C16C8-42C6-47BD-8A40-5E40AEF78345}" type="presParOf" srcId="{8E76272A-CE3E-4D12-B983-8FB136F6A52B}" destId="{421772EB-A28C-4249-9248-E9285A7294E2}" srcOrd="0" destOrd="0" presId="urn:microsoft.com/office/officeart/2005/8/layout/pyramid2"/>
+    <dgm:cxn modelId="{C6CC6D46-78F8-433E-B09A-58F090B2D8AE}" type="presParOf" srcId="{8E76272A-CE3E-4D12-B983-8FB136F6A52B}" destId="{67A66B3D-BAEA-4734-81A4-3FA61A2837F6}" srcOrd="1" destOrd="0" presId="urn:microsoft.com/office/officeart/2005/8/layout/pyramid2"/>
+    <dgm:cxn modelId="{E0DCF367-FA15-426B-AC84-1DA1AF10DD50}" type="presParOf" srcId="{67A66B3D-BAEA-4734-81A4-3FA61A2837F6}" destId="{128154D5-B7B6-4090-B776-DC63838EC167}" srcOrd="0" destOrd="0" presId="urn:microsoft.com/office/officeart/2005/8/layout/pyramid2"/>
+    <dgm:cxn modelId="{966C702C-A5E8-40A7-82BA-BF82257B9AF4}" type="presParOf" srcId="{67A66B3D-BAEA-4734-81A4-3FA61A2837F6}" destId="{5956F3D9-764E-468B-BBEC-69595642B66D}" srcOrd="1" destOrd="0" presId="urn:microsoft.com/office/officeart/2005/8/layout/pyramid2"/>
+    <dgm:cxn modelId="{3AFCA90A-2D3B-4996-BBAF-57C16663BFC3}" type="presParOf" srcId="{67A66B3D-BAEA-4734-81A4-3FA61A2837F6}" destId="{E9E54B10-0E80-4EC7-BDC9-1B1E1CD3F5FC}" srcOrd="2" destOrd="0" presId="urn:microsoft.com/office/officeart/2005/8/layout/pyramid2"/>
+    <dgm:cxn modelId="{4B7DFE7B-FEE8-41D8-ADA2-B7D3C55EE716}" type="presParOf" srcId="{67A66B3D-BAEA-4734-81A4-3FA61A2837F6}" destId="{2533FDDA-1140-4423-8215-A249C25D2753}" srcOrd="3" destOrd="0" presId="urn:microsoft.com/office/officeart/2005/8/layout/pyramid2"/>
+    <dgm:cxn modelId="{5CA14DAA-7480-46BA-92F7-BCE363E8F8C0}" type="presParOf" srcId="{67A66B3D-BAEA-4734-81A4-3FA61A2837F6}" destId="{B5BCA4F7-7F6F-43C2-84D5-1C28E4BBCA24}" srcOrd="4" destOrd="0" presId="urn:microsoft.com/office/officeart/2005/8/layout/pyramid2"/>
+    <dgm:cxn modelId="{27DA79F0-2BB0-47DF-9B4F-F0D382BA6389}" type="presParOf" srcId="{67A66B3D-BAEA-4734-81A4-3FA61A2837F6}" destId="{53133F68-D5DF-411C-9C30-07A43607D1F3}" srcOrd="5" destOrd="0" presId="urn:microsoft.com/office/officeart/2005/8/layout/pyramid2"/>
+    <dgm:cxn modelId="{4F7F22DC-E7BD-4FEC-9BA2-62932197447B}" type="presParOf" srcId="{67A66B3D-BAEA-4734-81A4-3FA61A2837F6}" destId="{54EC23F3-F115-4CD3-9500-0768D2AE6E17}" srcOrd="6" destOrd="0" presId="urn:microsoft.com/office/officeart/2005/8/layout/pyramid2"/>
+    <dgm:cxn modelId="{98C07E9B-82C9-4BD7-A0AE-C8CDB00B6325}" type="presParOf" srcId="{67A66B3D-BAEA-4734-81A4-3FA61A2837F6}" destId="{6655755C-E94F-4B60-8554-ED3FF4C2751D}" srcOrd="7" destOrd="0" presId="urn:microsoft.com/office/officeart/2005/8/layout/pyramid2"/>
+  </dgm:cxnLst>
+  <dgm:bg/>
+  <dgm:whole/>
+  <dgm:extLst>
+    <a:ext uri="http://schemas.microsoft.com/office/drawing/2008/diagram">
+      <dsp:dataModelExt xmlns:dsp="http://schemas.microsoft.com/office/drawing/2008/diagram" relId="rId7" minVer="http://schemas.openxmlformats.org/drawingml/2006/diagram"/>
+    </a:ext>
+  </dgm:extLst>
+</dgm:dataModel>
+</file>
+
+<file path=ppt/diagrams/data15.xml><?xml version="1.0" encoding="utf-8"?>
 <dgm:dataModel xmlns:dgm="http://schemas.openxmlformats.org/drawingml/2006/diagram" xmlns:a="http://schemas.openxmlformats.org/drawingml/2006/main">
   <dgm:ptLst>
     <dgm:pt modelId="{555E5EE3-B363-4D6C-88F1-916B33266448}" type="doc">
@@ -20960,6 +21964,404 @@
       <dsp:cNvGrpSpPr/>
     </dsp:nvGrpSpPr>
     <dsp:grpSpPr/>
+    <dsp:sp modelId="{421772EB-A28C-4249-9248-E9285A7294E2}">
+      <dsp:nvSpPr>
+        <dsp:cNvPr id="0" name=""/>
+        <dsp:cNvSpPr/>
+      </dsp:nvSpPr>
+      <dsp:spPr>
+        <a:xfrm rot="10800000">
+          <a:off x="0" y="0"/>
+          <a:ext cx="3513138" cy="3513138"/>
+        </a:xfrm>
+        <a:prstGeom prst="triangle">
+          <a:avLst/>
+        </a:prstGeom>
+        <a:gradFill rotWithShape="0">
+          <a:gsLst>
+            <a:gs pos="0">
+              <a:schemeClr val="accent1">
+                <a:hueOff val="0"/>
+                <a:satOff val="0"/>
+                <a:lumOff val="0"/>
+                <a:alphaOff val="0"/>
+                <a:satMod val="103000"/>
+                <a:lumMod val="102000"/>
+                <a:tint val="94000"/>
+              </a:schemeClr>
+            </a:gs>
+            <a:gs pos="50000">
+              <a:schemeClr val="accent1">
+                <a:hueOff val="0"/>
+                <a:satOff val="0"/>
+                <a:lumOff val="0"/>
+                <a:alphaOff val="0"/>
+                <a:satMod val="110000"/>
+                <a:lumMod val="100000"/>
+                <a:shade val="100000"/>
+              </a:schemeClr>
+            </a:gs>
+            <a:gs pos="100000">
+              <a:schemeClr val="accent1">
+                <a:hueOff val="0"/>
+                <a:satOff val="0"/>
+                <a:lumOff val="0"/>
+                <a:alphaOff val="0"/>
+                <a:lumMod val="99000"/>
+                <a:satMod val="120000"/>
+                <a:shade val="78000"/>
+              </a:schemeClr>
+            </a:gs>
+          </a:gsLst>
+          <a:lin ang="5400000" scaled="0"/>
+        </a:gradFill>
+        <a:ln>
+          <a:noFill/>
+        </a:ln>
+        <a:effectLst>
+          <a:outerShdw blurRad="57150" dist="19050" dir="5400000" algn="ctr" rotWithShape="0">
+            <a:srgbClr val="000000">
+              <a:alpha val="63000"/>
+            </a:srgbClr>
+          </a:outerShdw>
+        </a:effectLst>
+      </dsp:spPr>
+      <dsp:style>
+        <a:lnRef idx="0">
+          <a:scrgbClr r="0" g="0" b="0"/>
+        </a:lnRef>
+        <a:fillRef idx="3">
+          <a:scrgbClr r="0" g="0" b="0"/>
+        </a:fillRef>
+        <a:effectRef idx="3">
+          <a:scrgbClr r="0" g="0" b="0"/>
+        </a:effectRef>
+        <a:fontRef idx="minor">
+          <a:schemeClr val="lt1"/>
+        </a:fontRef>
+      </dsp:style>
+    </dsp:sp>
+    <dsp:sp modelId="{128154D5-B7B6-4090-B776-DC63838EC167}">
+      <dsp:nvSpPr>
+        <dsp:cNvPr id="0" name=""/>
+        <dsp:cNvSpPr/>
+      </dsp:nvSpPr>
+      <dsp:spPr>
+        <a:xfrm>
+          <a:off x="1199162" y="351656"/>
+          <a:ext cx="2283539" cy="624405"/>
+        </a:xfrm>
+        <a:prstGeom prst="roundRect">
+          <a:avLst/>
+        </a:prstGeom>
+        <a:solidFill>
+          <a:schemeClr val="lt1">
+            <a:alpha val="90000"/>
+            <a:hueOff val="0"/>
+            <a:satOff val="0"/>
+            <a:lumOff val="0"/>
+            <a:alphaOff val="0"/>
+          </a:schemeClr>
+        </a:solidFill>
+        <a:ln w="6350" cap="flat" cmpd="sng" algn="ctr">
+          <a:solidFill>
+            <a:schemeClr val="accent1">
+              <a:hueOff val="0"/>
+              <a:satOff val="0"/>
+              <a:lumOff val="0"/>
+              <a:alphaOff val="0"/>
+            </a:schemeClr>
+          </a:solidFill>
+          <a:prstDash val="solid"/>
+          <a:miter lim="800000"/>
+        </a:ln>
+        <a:effectLst/>
+      </dsp:spPr>
+      <dsp:style>
+        <a:lnRef idx="1">
+          <a:scrgbClr r="0" g="0" b="0"/>
+        </a:lnRef>
+        <a:fillRef idx="1">
+          <a:scrgbClr r="0" g="0" b="0"/>
+        </a:fillRef>
+        <a:effectRef idx="2">
+          <a:scrgbClr r="0" g="0" b="0"/>
+        </a:effectRef>
+        <a:fontRef idx="minor"/>
+      </dsp:style>
+      <dsp:txBody>
+        <a:bodyPr spcFirstLastPara="0" vert="horz" wrap="square" lIns="57150" tIns="57150" rIns="57150" bIns="57150" numCol="1" spcCol="1270" anchor="ctr" anchorCtr="0">
+          <a:noAutofit/>
+        </a:bodyPr>
+        <a:lstStyle/>
+        <a:p>
+          <a:pPr marL="0" lvl="0" indent="0" algn="ctr" defTabSz="666750">
+            <a:lnSpc>
+              <a:spcPct val="90000"/>
+            </a:lnSpc>
+            <a:spcBef>
+              <a:spcPct val="0"/>
+            </a:spcBef>
+            <a:spcAft>
+              <a:spcPct val="35000"/>
+            </a:spcAft>
+            <a:buNone/>
+          </a:pPr>
+          <a:r>
+            <a:rPr lang="en-US" sz="1500" kern="1200" dirty="0"/>
+            <a:t>Utility-based agents</a:t>
+          </a:r>
+        </a:p>
+      </dsp:txBody>
+      <dsp:txXfrm>
+        <a:off x="1229643" y="382137"/>
+        <a:ext cx="2222577" cy="563443"/>
+      </dsp:txXfrm>
+    </dsp:sp>
+    <dsp:sp modelId="{E9E54B10-0E80-4EC7-BDC9-1B1E1CD3F5FC}">
+      <dsp:nvSpPr>
+        <dsp:cNvPr id="0" name=""/>
+        <dsp:cNvSpPr/>
+      </dsp:nvSpPr>
+      <dsp:spPr>
+        <a:xfrm>
+          <a:off x="1199162" y="1054112"/>
+          <a:ext cx="2283539" cy="624405"/>
+        </a:xfrm>
+        <a:prstGeom prst="roundRect">
+          <a:avLst/>
+        </a:prstGeom>
+        <a:solidFill>
+          <a:schemeClr val="lt1">
+            <a:alpha val="90000"/>
+            <a:hueOff val="0"/>
+            <a:satOff val="0"/>
+            <a:lumOff val="0"/>
+            <a:alphaOff val="0"/>
+          </a:schemeClr>
+        </a:solidFill>
+        <a:ln w="6350" cap="flat" cmpd="sng" algn="ctr">
+          <a:solidFill>
+            <a:schemeClr val="accent1">
+              <a:hueOff val="0"/>
+              <a:satOff val="0"/>
+              <a:lumOff val="0"/>
+              <a:alphaOff val="0"/>
+            </a:schemeClr>
+          </a:solidFill>
+          <a:prstDash val="solid"/>
+          <a:miter lim="800000"/>
+        </a:ln>
+        <a:effectLst/>
+      </dsp:spPr>
+      <dsp:style>
+        <a:lnRef idx="1">
+          <a:scrgbClr r="0" g="0" b="0"/>
+        </a:lnRef>
+        <a:fillRef idx="1">
+          <a:scrgbClr r="0" g="0" b="0"/>
+        </a:fillRef>
+        <a:effectRef idx="2">
+          <a:scrgbClr r="0" g="0" b="0"/>
+        </a:effectRef>
+        <a:fontRef idx="minor"/>
+      </dsp:style>
+      <dsp:txBody>
+        <a:bodyPr spcFirstLastPara="0" vert="horz" wrap="square" lIns="57150" tIns="57150" rIns="57150" bIns="57150" numCol="1" spcCol="1270" anchor="ctr" anchorCtr="0">
+          <a:noAutofit/>
+        </a:bodyPr>
+        <a:lstStyle/>
+        <a:p>
+          <a:pPr marL="0" lvl="0" indent="0" algn="ctr" defTabSz="666750">
+            <a:lnSpc>
+              <a:spcPct val="90000"/>
+            </a:lnSpc>
+            <a:spcBef>
+              <a:spcPct val="0"/>
+            </a:spcBef>
+            <a:spcAft>
+              <a:spcPct val="35000"/>
+            </a:spcAft>
+            <a:buNone/>
+          </a:pPr>
+          <a:r>
+            <a:rPr lang="en-US" sz="1500" kern="1200" dirty="0"/>
+            <a:t>Goal-based agents</a:t>
+          </a:r>
+        </a:p>
+      </dsp:txBody>
+      <dsp:txXfrm>
+        <a:off x="1229643" y="1084593"/>
+        <a:ext cx="2222577" cy="563443"/>
+      </dsp:txXfrm>
+    </dsp:sp>
+    <dsp:sp modelId="{B5BCA4F7-7F6F-43C2-84D5-1C28E4BBCA24}">
+      <dsp:nvSpPr>
+        <dsp:cNvPr id="0" name=""/>
+        <dsp:cNvSpPr/>
+      </dsp:nvSpPr>
+      <dsp:spPr>
+        <a:xfrm>
+          <a:off x="1199162" y="1756569"/>
+          <a:ext cx="2283539" cy="624405"/>
+        </a:xfrm>
+        <a:prstGeom prst="roundRect">
+          <a:avLst/>
+        </a:prstGeom>
+        <a:solidFill>
+          <a:schemeClr val="lt1">
+            <a:alpha val="90000"/>
+            <a:hueOff val="0"/>
+            <a:satOff val="0"/>
+            <a:lumOff val="0"/>
+            <a:alphaOff val="0"/>
+          </a:schemeClr>
+        </a:solidFill>
+        <a:ln w="6350" cap="flat" cmpd="sng" algn="ctr">
+          <a:solidFill>
+            <a:schemeClr val="accent1">
+              <a:hueOff val="0"/>
+              <a:satOff val="0"/>
+              <a:lumOff val="0"/>
+              <a:alphaOff val="0"/>
+            </a:schemeClr>
+          </a:solidFill>
+          <a:prstDash val="solid"/>
+          <a:miter lim="800000"/>
+        </a:ln>
+        <a:effectLst/>
+      </dsp:spPr>
+      <dsp:style>
+        <a:lnRef idx="1">
+          <a:scrgbClr r="0" g="0" b="0"/>
+        </a:lnRef>
+        <a:fillRef idx="1">
+          <a:scrgbClr r="0" g="0" b="0"/>
+        </a:fillRef>
+        <a:effectRef idx="2">
+          <a:scrgbClr r="0" g="0" b="0"/>
+        </a:effectRef>
+        <a:fontRef idx="minor"/>
+      </dsp:style>
+      <dsp:txBody>
+        <a:bodyPr spcFirstLastPara="0" vert="horz" wrap="square" lIns="57150" tIns="57150" rIns="57150" bIns="57150" numCol="1" spcCol="1270" anchor="ctr" anchorCtr="0">
+          <a:noAutofit/>
+        </a:bodyPr>
+        <a:lstStyle/>
+        <a:p>
+          <a:pPr marL="0" lvl="0" indent="0" algn="ctr" defTabSz="666750">
+            <a:lnSpc>
+              <a:spcPct val="90000"/>
+            </a:lnSpc>
+            <a:spcBef>
+              <a:spcPct val="0"/>
+            </a:spcBef>
+            <a:spcAft>
+              <a:spcPct val="35000"/>
+            </a:spcAft>
+            <a:buNone/>
+          </a:pPr>
+          <a:r>
+            <a:rPr lang="en-US" sz="1500" kern="1200"/>
+            <a:t>Model-based reflex agents</a:t>
+          </a:r>
+          <a:endParaRPr lang="en-US" sz="1500" kern="1200" dirty="0"/>
+        </a:p>
+      </dsp:txBody>
+      <dsp:txXfrm>
+        <a:off x="1229643" y="1787050"/>
+        <a:ext cx="2222577" cy="563443"/>
+      </dsp:txXfrm>
+    </dsp:sp>
+    <dsp:sp modelId="{54EC23F3-F115-4CD3-9500-0768D2AE6E17}">
+      <dsp:nvSpPr>
+        <dsp:cNvPr id="0" name=""/>
+        <dsp:cNvSpPr/>
+      </dsp:nvSpPr>
+      <dsp:spPr>
+        <a:xfrm>
+          <a:off x="1199162" y="2459025"/>
+          <a:ext cx="2283539" cy="624405"/>
+        </a:xfrm>
+        <a:prstGeom prst="roundRect">
+          <a:avLst/>
+        </a:prstGeom>
+        <a:solidFill>
+          <a:schemeClr val="lt1">
+            <a:alpha val="90000"/>
+            <a:hueOff val="0"/>
+            <a:satOff val="0"/>
+            <a:lumOff val="0"/>
+            <a:alphaOff val="0"/>
+          </a:schemeClr>
+        </a:solidFill>
+        <a:ln w="6350" cap="flat" cmpd="sng" algn="ctr">
+          <a:solidFill>
+            <a:schemeClr val="accent1">
+              <a:hueOff val="0"/>
+              <a:satOff val="0"/>
+              <a:lumOff val="0"/>
+              <a:alphaOff val="0"/>
+            </a:schemeClr>
+          </a:solidFill>
+          <a:prstDash val="solid"/>
+          <a:miter lim="800000"/>
+        </a:ln>
+        <a:effectLst/>
+      </dsp:spPr>
+      <dsp:style>
+        <a:lnRef idx="1">
+          <a:scrgbClr r="0" g="0" b="0"/>
+        </a:lnRef>
+        <a:fillRef idx="1">
+          <a:scrgbClr r="0" g="0" b="0"/>
+        </a:fillRef>
+        <a:effectRef idx="2">
+          <a:scrgbClr r="0" g="0" b="0"/>
+        </a:effectRef>
+        <a:fontRef idx="minor"/>
+      </dsp:style>
+      <dsp:txBody>
+        <a:bodyPr spcFirstLastPara="0" vert="horz" wrap="square" lIns="57150" tIns="57150" rIns="57150" bIns="57150" numCol="1" spcCol="1270" anchor="ctr" anchorCtr="0">
+          <a:noAutofit/>
+        </a:bodyPr>
+        <a:lstStyle/>
+        <a:p>
+          <a:pPr marL="0" lvl="0" indent="0" algn="ctr" defTabSz="666750">
+            <a:lnSpc>
+              <a:spcPct val="90000"/>
+            </a:lnSpc>
+            <a:spcBef>
+              <a:spcPct val="0"/>
+            </a:spcBef>
+            <a:spcAft>
+              <a:spcPct val="35000"/>
+            </a:spcAft>
+            <a:buNone/>
+          </a:pPr>
+          <a:r>
+            <a:rPr lang="en-US" sz="1500" kern="1200" dirty="0"/>
+            <a:t>Simple reflex agents</a:t>
+          </a:r>
+        </a:p>
+      </dsp:txBody>
+      <dsp:txXfrm>
+        <a:off x="1229643" y="2489506"/>
+        <a:ext cx="2222577" cy="563443"/>
+      </dsp:txXfrm>
+    </dsp:sp>
+  </dsp:spTree>
+</dsp:drawing>
+</file>
+
+<file path=ppt/diagrams/drawing15.xml><?xml version="1.0" encoding="utf-8"?>
+<dsp:drawing xmlns:dgm="http://schemas.openxmlformats.org/drawingml/2006/diagram" xmlns:dsp="http://schemas.microsoft.com/office/drawing/2008/diagram" xmlns:a="http://schemas.openxmlformats.org/drawingml/2006/main">
+  <dsp:spTree>
+    <dsp:nvGrpSpPr>
+      <dsp:cNvPr id="0" name=""/>
+      <dsp:cNvGrpSpPr/>
+    </dsp:nvGrpSpPr>
+    <dsp:grpSpPr/>
     <dsp:sp modelId="{26123794-7DC3-4213-9409-4DAC10BB4149}">
       <dsp:nvSpPr>
         <dsp:cNvPr id="0" name=""/>
@@ -26685,6 +28087,135 @@
 </file>
 
 <file path=ppt/diagrams/layout14.xml><?xml version="1.0" encoding="utf-8"?>
+<dgm:layoutDef xmlns:dgm="http://schemas.openxmlformats.org/drawingml/2006/diagram" xmlns:a="http://schemas.openxmlformats.org/drawingml/2006/main" uniqueId="urn:microsoft.com/office/officeart/2005/8/layout/pyramid2">
+  <dgm:title val=""/>
+  <dgm:desc val=""/>
+  <dgm:catLst>
+    <dgm:cat type="pyramid" pri="3000"/>
+    <dgm:cat type="list" pri="21000"/>
+    <dgm:cat type="convert" pri="17000"/>
+  </dgm:catLst>
+  <dgm:sampData useDef="1">
+    <dgm:dataModel>
+      <dgm:ptLst/>
+      <dgm:bg/>
+      <dgm:whole/>
+    </dgm:dataModel>
+  </dgm:sampData>
+  <dgm:styleData useDef="1">
+    <dgm:dataModel>
+      <dgm:ptLst/>
+      <dgm:bg/>
+      <dgm:whole/>
+    </dgm:dataModel>
+  </dgm:styleData>
+  <dgm:clrData useDef="1">
+    <dgm:dataModel>
+      <dgm:ptLst/>
+      <dgm:bg/>
+      <dgm:whole/>
+    </dgm:dataModel>
+  </dgm:clrData>
+  <dgm:layoutNode name="compositeShape">
+    <dgm:alg type="composite"/>
+    <dgm:shape xmlns:r="http://schemas.openxmlformats.org/officeDocument/2006/relationships" r:blip="">
+      <dgm:adjLst/>
+    </dgm:shape>
+    <dgm:presOf/>
+    <dgm:varLst>
+      <dgm:dir/>
+      <dgm:resizeHandles/>
+    </dgm:varLst>
+    <dgm:choose name="Name0">
+      <dgm:if name="Name1" func="var" arg="dir" op="equ" val="norm">
+        <dgm:constrLst>
+          <dgm:constr type="w" for="ch" forName="pyramid" refType="h"/>
+          <dgm:constr type="h" for="ch" forName="pyramid" refType="h"/>
+          <dgm:constr type="h" for="ch" forName="theList" refType="h" fact="0.8"/>
+          <dgm:constr type="w" for="ch" forName="theList" refType="h" fact="0.65"/>
+          <dgm:constr type="ctrY" for="ch" forName="theList" refType="h" refFor="ch" refForName="pyramid" fact="0.5"/>
+          <dgm:constr type="l" for="ch" forName="theList" refType="w" refFor="ch" refForName="pyramid" fact="0.5"/>
+          <dgm:constr type="h" for="des" forName="aSpace" refType="h" fact="0.1"/>
+        </dgm:constrLst>
+      </dgm:if>
+      <dgm:else name="Name2">
+        <dgm:constrLst>
+          <dgm:constr type="w" for="ch" forName="pyramid" refType="h"/>
+          <dgm:constr type="h" for="ch" forName="pyramid" refType="h"/>
+          <dgm:constr type="h" for="ch" forName="theList" refType="h" fact="0.8"/>
+          <dgm:constr type="w" for="ch" forName="theList" refType="h" fact="0.65"/>
+          <dgm:constr type="ctrY" for="ch" forName="theList" refType="h" refFor="ch" refForName="pyramid" fact="0.5"/>
+          <dgm:constr type="r" for="ch" forName="theList" refType="w" refFor="ch" refForName="pyramid" fact="0.5"/>
+          <dgm:constr type="h" for="des" forName="aSpace" refType="h" fact="0.1"/>
+        </dgm:constrLst>
+      </dgm:else>
+    </dgm:choose>
+    <dgm:ruleLst/>
+    <dgm:choose name="Name3">
+      <dgm:if name="Name4" axis="ch" ptType="node" func="cnt" op="gte" val="1">
+        <dgm:layoutNode name="pyramid" styleLbl="node1">
+          <dgm:alg type="sp"/>
+          <dgm:shape xmlns:r="http://schemas.openxmlformats.org/officeDocument/2006/relationships" type="triangle" r:blip="">
+            <dgm:adjLst/>
+          </dgm:shape>
+          <dgm:presOf/>
+          <dgm:constrLst/>
+          <dgm:ruleLst/>
+        </dgm:layoutNode>
+        <dgm:layoutNode name="theList">
+          <dgm:alg type="lin">
+            <dgm:param type="linDir" val="fromT"/>
+          </dgm:alg>
+          <dgm:shape xmlns:r="http://schemas.openxmlformats.org/officeDocument/2006/relationships" r:blip="">
+            <dgm:adjLst/>
+          </dgm:shape>
+          <dgm:presOf/>
+          <dgm:constrLst>
+            <dgm:constr type="w" for="ch" forName="aNode" refType="w"/>
+            <dgm:constr type="h" for="ch" forName="aNode" refType="h"/>
+            <dgm:constr type="primFontSz" for="ch" ptType="node" op="equ"/>
+          </dgm:constrLst>
+          <dgm:ruleLst/>
+          <dgm:forEach name="aNodeForEach" axis="ch" ptType="node">
+            <dgm:layoutNode name="aNode" styleLbl="fgAcc1">
+              <dgm:varLst>
+                <dgm:bulletEnabled val="1"/>
+              </dgm:varLst>
+              <dgm:alg type="tx"/>
+              <dgm:shape xmlns:r="http://schemas.openxmlformats.org/officeDocument/2006/relationships" type="roundRect" r:blip="">
+                <dgm:adjLst/>
+              </dgm:shape>
+              <dgm:presOf axis="desOrSelf" ptType="node"/>
+              <dgm:constrLst>
+                <dgm:constr type="primFontSz" val="65"/>
+                <dgm:constr type="tMarg" refType="primFontSz" fact="0.3"/>
+                <dgm:constr type="bMarg" refType="primFontSz" fact="0.3"/>
+                <dgm:constr type="lMarg" refType="primFontSz" fact="0.3"/>
+                <dgm:constr type="rMarg" refType="primFontSz" fact="0.3"/>
+              </dgm:constrLst>
+              <dgm:ruleLst>
+                <dgm:rule type="primFontSz" val="5" fact="NaN" max="NaN"/>
+              </dgm:ruleLst>
+            </dgm:layoutNode>
+            <dgm:layoutNode name="aSpace">
+              <dgm:alg type="sp"/>
+              <dgm:shape xmlns:r="http://schemas.openxmlformats.org/officeDocument/2006/relationships" r:blip="">
+                <dgm:adjLst/>
+              </dgm:shape>
+              <dgm:presOf/>
+              <dgm:constrLst/>
+              <dgm:ruleLst/>
+            </dgm:layoutNode>
+          </dgm:forEach>
+        </dgm:layoutNode>
+      </dgm:if>
+      <dgm:else name="Name5"/>
+    </dgm:choose>
+  </dgm:layoutNode>
+</dgm:layoutDef>
+</file>
+
+<file path=ppt/diagrams/layout15.xml><?xml version="1.0" encoding="utf-8"?>
 <dgm:layoutDef xmlns:dgm="http://schemas.openxmlformats.org/drawingml/2006/diagram" xmlns:a="http://schemas.openxmlformats.org/drawingml/2006/main" uniqueId="urn:microsoft.com/office/officeart/2005/8/layout/default">
   <dgm:title val=""/>
   <dgm:desc val=""/>
@@ -33423,6 +34954,1040 @@
 </file>
 
 <file path=ppt/diagrams/quickStyle14.xml><?xml version="1.0" encoding="utf-8"?>
+<dgm:styleDef xmlns:dgm="http://schemas.openxmlformats.org/drawingml/2006/diagram" xmlns:a="http://schemas.openxmlformats.org/drawingml/2006/main" uniqueId="urn:microsoft.com/office/officeart/2005/8/quickstyle/simple5">
+  <dgm:title val=""/>
+  <dgm:desc val=""/>
+  <dgm:catLst>
+    <dgm:cat type="simple" pri="10500"/>
+  </dgm:catLst>
+  <dgm:scene3d>
+    <a:camera prst="orthographicFront"/>
+    <a:lightRig rig="threePt" dir="t"/>
+  </dgm:scene3d>
+  <dgm:styleLbl name="node0">
+    <dgm:scene3d>
+      <a:camera prst="orthographicFront"/>
+      <a:lightRig rig="threePt" dir="t"/>
+    </dgm:scene3d>
+    <dgm:sp3d/>
+    <dgm:txPr/>
+    <dgm:style>
+      <a:lnRef idx="0">
+        <a:scrgbClr r="0" g="0" b="0"/>
+      </a:lnRef>
+      <a:fillRef idx="3">
+        <a:scrgbClr r="0" g="0" b="0"/>
+      </a:fillRef>
+      <a:effectRef idx="3">
+        <a:scrgbClr r="0" g="0" b="0"/>
+      </a:effectRef>
+      <a:fontRef idx="minor">
+        <a:schemeClr val="lt1"/>
+      </a:fontRef>
+    </dgm:style>
+  </dgm:styleLbl>
+  <dgm:styleLbl name="lnNode1">
+    <dgm:scene3d>
+      <a:camera prst="orthographicFront"/>
+      <a:lightRig rig="threePt" dir="t"/>
+    </dgm:scene3d>
+    <dgm:sp3d/>
+    <dgm:txPr/>
+    <dgm:style>
+      <a:lnRef idx="0">
+        <a:scrgbClr r="0" g="0" b="0"/>
+      </a:lnRef>
+      <a:fillRef idx="3">
+        <a:scrgbClr r="0" g="0" b="0"/>
+      </a:fillRef>
+      <a:effectRef idx="3">
+        <a:scrgbClr r="0" g="0" b="0"/>
+      </a:effectRef>
+      <a:fontRef idx="minor">
+        <a:schemeClr val="lt1"/>
+      </a:fontRef>
+    </dgm:style>
+  </dgm:styleLbl>
+  <dgm:styleLbl name="vennNode1">
+    <dgm:scene3d>
+      <a:camera prst="orthographicFront"/>
+      <a:lightRig rig="threePt" dir="t"/>
+    </dgm:scene3d>
+    <dgm:sp3d/>
+    <dgm:txPr/>
+    <dgm:style>
+      <a:lnRef idx="0">
+        <a:scrgbClr r="0" g="0" b="0"/>
+      </a:lnRef>
+      <a:fillRef idx="3">
+        <a:scrgbClr r="0" g="0" b="0"/>
+      </a:fillRef>
+      <a:effectRef idx="3">
+        <a:scrgbClr r="0" g="0" b="0"/>
+      </a:effectRef>
+      <a:fontRef idx="minor">
+        <a:schemeClr val="tx1"/>
+      </a:fontRef>
+    </dgm:style>
+  </dgm:styleLbl>
+  <dgm:styleLbl name="alignNode1">
+    <dgm:scene3d>
+      <a:camera prst="orthographicFront"/>
+      <a:lightRig rig="threePt" dir="t"/>
+    </dgm:scene3d>
+    <dgm:sp3d/>
+    <dgm:txPr/>
+    <dgm:style>
+      <a:lnRef idx="1">
+        <a:scrgbClr r="0" g="0" b="0"/>
+      </a:lnRef>
+      <a:fillRef idx="3">
+        <a:scrgbClr r="0" g="0" b="0"/>
+      </a:fillRef>
+      <a:effectRef idx="3">
+        <a:scrgbClr r="0" g="0" b="0"/>
+      </a:effectRef>
+      <a:fontRef idx="minor">
+        <a:schemeClr val="lt1"/>
+      </a:fontRef>
+    </dgm:style>
+  </dgm:styleLbl>
+  <dgm:styleLbl name="node1">
+    <dgm:scene3d>
+      <a:camera prst="orthographicFront"/>
+      <a:lightRig rig="threePt" dir="t"/>
+    </dgm:scene3d>
+    <dgm:sp3d/>
+    <dgm:txPr/>
+    <dgm:style>
+      <a:lnRef idx="0">
+        <a:scrgbClr r="0" g="0" b="0"/>
+      </a:lnRef>
+      <a:fillRef idx="3">
+        <a:scrgbClr r="0" g="0" b="0"/>
+      </a:fillRef>
+      <a:effectRef idx="3">
+        <a:scrgbClr r="0" g="0" b="0"/>
+      </a:effectRef>
+      <a:fontRef idx="minor">
+        <a:schemeClr val="lt1"/>
+      </a:fontRef>
+    </dgm:style>
+  </dgm:styleLbl>
+  <dgm:styleLbl name="node2">
+    <dgm:scene3d>
+      <a:camera prst="orthographicFront"/>
+      <a:lightRig rig="threePt" dir="t"/>
+    </dgm:scene3d>
+    <dgm:sp3d/>
+    <dgm:txPr/>
+    <dgm:style>
+      <a:lnRef idx="0">
+        <a:scrgbClr r="0" g="0" b="0"/>
+      </a:lnRef>
+      <a:fillRef idx="3">
+        <a:scrgbClr r="0" g="0" b="0"/>
+      </a:fillRef>
+      <a:effectRef idx="3">
+        <a:scrgbClr r="0" g="0" b="0"/>
+      </a:effectRef>
+      <a:fontRef idx="minor">
+        <a:schemeClr val="lt1"/>
+      </a:fontRef>
+    </dgm:style>
+  </dgm:styleLbl>
+  <dgm:styleLbl name="node3">
+    <dgm:scene3d>
+      <a:camera prst="orthographicFront"/>
+      <a:lightRig rig="threePt" dir="t"/>
+    </dgm:scene3d>
+    <dgm:sp3d/>
+    <dgm:txPr/>
+    <dgm:style>
+      <a:lnRef idx="0">
+        <a:scrgbClr r="0" g="0" b="0"/>
+      </a:lnRef>
+      <a:fillRef idx="3">
+        <a:scrgbClr r="0" g="0" b="0"/>
+      </a:fillRef>
+      <a:effectRef idx="3">
+        <a:scrgbClr r="0" g="0" b="0"/>
+      </a:effectRef>
+      <a:fontRef idx="minor">
+        <a:schemeClr val="lt1"/>
+      </a:fontRef>
+    </dgm:style>
+  </dgm:styleLbl>
+  <dgm:styleLbl name="node4">
+    <dgm:scene3d>
+      <a:camera prst="orthographicFront"/>
+      <a:lightRig rig="threePt" dir="t"/>
+    </dgm:scene3d>
+    <dgm:sp3d/>
+    <dgm:txPr/>
+    <dgm:style>
+      <a:lnRef idx="0">
+        <a:scrgbClr r="0" g="0" b="0"/>
+      </a:lnRef>
+      <a:fillRef idx="3">
+        <a:scrgbClr r="0" g="0" b="0"/>
+      </a:fillRef>
+      <a:effectRef idx="3">
+        <a:scrgbClr r="0" g="0" b="0"/>
+      </a:effectRef>
+      <a:fontRef idx="minor">
+        <a:schemeClr val="lt1"/>
+      </a:fontRef>
+    </dgm:style>
+  </dgm:styleLbl>
+  <dgm:styleLbl name="fgImgPlace1">
+    <dgm:scene3d>
+      <a:camera prst="orthographicFront"/>
+      <a:lightRig rig="threePt" dir="t"/>
+    </dgm:scene3d>
+    <dgm:sp3d/>
+    <dgm:txPr/>
+    <dgm:style>
+      <a:lnRef idx="0">
+        <a:scrgbClr r="0" g="0" b="0"/>
+      </a:lnRef>
+      <a:fillRef idx="1">
+        <a:scrgbClr r="0" g="0" b="0"/>
+      </a:fillRef>
+      <a:effectRef idx="3">
+        <a:scrgbClr r="0" g="0" b="0"/>
+      </a:effectRef>
+      <a:fontRef idx="minor"/>
+    </dgm:style>
+  </dgm:styleLbl>
+  <dgm:styleLbl name="alignImgPlace1">
+    <dgm:scene3d>
+      <a:camera prst="orthographicFront"/>
+      <a:lightRig rig="threePt" dir="t"/>
+    </dgm:scene3d>
+    <dgm:sp3d/>
+    <dgm:txPr/>
+    <dgm:style>
+      <a:lnRef idx="0">
+        <a:scrgbClr r="0" g="0" b="0"/>
+      </a:lnRef>
+      <a:fillRef idx="1">
+        <a:scrgbClr r="0" g="0" b="0"/>
+      </a:fillRef>
+      <a:effectRef idx="3">
+        <a:scrgbClr r="0" g="0" b="0"/>
+      </a:effectRef>
+      <a:fontRef idx="minor"/>
+    </dgm:style>
+  </dgm:styleLbl>
+  <dgm:styleLbl name="bgImgPlace1">
+    <dgm:scene3d>
+      <a:camera prst="orthographicFront"/>
+      <a:lightRig rig="threePt" dir="t"/>
+    </dgm:scene3d>
+    <dgm:sp3d/>
+    <dgm:txPr/>
+    <dgm:style>
+      <a:lnRef idx="0">
+        <a:scrgbClr r="0" g="0" b="0"/>
+      </a:lnRef>
+      <a:fillRef idx="1">
+        <a:scrgbClr r="0" g="0" b="0"/>
+      </a:fillRef>
+      <a:effectRef idx="3">
+        <a:scrgbClr r="0" g="0" b="0"/>
+      </a:effectRef>
+      <a:fontRef idx="minor"/>
+    </dgm:style>
+  </dgm:styleLbl>
+  <dgm:styleLbl name="sibTrans2D1">
+    <dgm:scene3d>
+      <a:camera prst="orthographicFront"/>
+      <a:lightRig rig="threePt" dir="t"/>
+    </dgm:scene3d>
+    <dgm:sp3d/>
+    <dgm:txPr/>
+    <dgm:style>
+      <a:lnRef idx="0">
+        <a:scrgbClr r="0" g="0" b="0"/>
+      </a:lnRef>
+      <a:fillRef idx="3">
+        <a:scrgbClr r="0" g="0" b="0"/>
+      </a:fillRef>
+      <a:effectRef idx="3">
+        <a:scrgbClr r="0" g="0" b="0"/>
+      </a:effectRef>
+      <a:fontRef idx="minor">
+        <a:schemeClr val="lt1"/>
+      </a:fontRef>
+    </dgm:style>
+  </dgm:styleLbl>
+  <dgm:styleLbl name="fgSibTrans2D1">
+    <dgm:scene3d>
+      <a:camera prst="orthographicFront"/>
+      <a:lightRig rig="threePt" dir="t"/>
+    </dgm:scene3d>
+    <dgm:sp3d/>
+    <dgm:txPr/>
+    <dgm:style>
+      <a:lnRef idx="0">
+        <a:scrgbClr r="0" g="0" b="0"/>
+      </a:lnRef>
+      <a:fillRef idx="3">
+        <a:scrgbClr r="0" g="0" b="0"/>
+      </a:fillRef>
+      <a:effectRef idx="3">
+        <a:scrgbClr r="0" g="0" b="0"/>
+      </a:effectRef>
+      <a:fontRef idx="minor">
+        <a:schemeClr val="lt1"/>
+      </a:fontRef>
+    </dgm:style>
+  </dgm:styleLbl>
+  <dgm:styleLbl name="bgSibTrans2D1">
+    <dgm:scene3d>
+      <a:camera prst="orthographicFront"/>
+      <a:lightRig rig="threePt" dir="t"/>
+    </dgm:scene3d>
+    <dgm:sp3d/>
+    <dgm:txPr/>
+    <dgm:style>
+      <a:lnRef idx="0">
+        <a:scrgbClr r="0" g="0" b="0"/>
+      </a:lnRef>
+      <a:fillRef idx="3">
+        <a:scrgbClr r="0" g="0" b="0"/>
+      </a:fillRef>
+      <a:effectRef idx="3">
+        <a:scrgbClr r="0" g="0" b="0"/>
+      </a:effectRef>
+      <a:fontRef idx="minor">
+        <a:schemeClr val="lt1"/>
+      </a:fontRef>
+    </dgm:style>
+  </dgm:styleLbl>
+  <dgm:styleLbl name="sibTrans1D1">
+    <dgm:scene3d>
+      <a:camera prst="orthographicFront"/>
+      <a:lightRig rig="threePt" dir="t"/>
+    </dgm:scene3d>
+    <dgm:sp3d/>
+    <dgm:txPr/>
+    <dgm:style>
+      <a:lnRef idx="1">
+        <a:scrgbClr r="0" g="0" b="0"/>
+      </a:lnRef>
+      <a:fillRef idx="0">
+        <a:scrgbClr r="0" g="0" b="0"/>
+      </a:fillRef>
+      <a:effectRef idx="0">
+        <a:scrgbClr r="0" g="0" b="0"/>
+      </a:effectRef>
+      <a:fontRef idx="minor"/>
+    </dgm:style>
+  </dgm:styleLbl>
+  <dgm:styleLbl name="callout">
+    <dgm:scene3d>
+      <a:camera prst="orthographicFront"/>
+      <a:lightRig rig="threePt" dir="t"/>
+    </dgm:scene3d>
+    <dgm:sp3d/>
+    <dgm:txPr/>
+    <dgm:style>
+      <a:lnRef idx="1">
+        <a:scrgbClr r="0" g="0" b="0"/>
+      </a:lnRef>
+      <a:fillRef idx="0">
+        <a:scrgbClr r="0" g="0" b="0"/>
+      </a:fillRef>
+      <a:effectRef idx="1">
+        <a:scrgbClr r="0" g="0" b="0"/>
+      </a:effectRef>
+      <a:fontRef idx="minor"/>
+    </dgm:style>
+  </dgm:styleLbl>
+  <dgm:styleLbl name="asst0">
+    <dgm:scene3d>
+      <a:camera prst="orthographicFront"/>
+      <a:lightRig rig="threePt" dir="t"/>
+    </dgm:scene3d>
+    <dgm:sp3d/>
+    <dgm:txPr/>
+    <dgm:style>
+      <a:lnRef idx="0">
+        <a:scrgbClr r="0" g="0" b="0"/>
+      </a:lnRef>
+      <a:fillRef idx="3">
+        <a:scrgbClr r="0" g="0" b="0"/>
+      </a:fillRef>
+      <a:effectRef idx="3">
+        <a:scrgbClr r="0" g="0" b="0"/>
+      </a:effectRef>
+      <a:fontRef idx="minor">
+        <a:schemeClr val="lt1"/>
+      </a:fontRef>
+    </dgm:style>
+  </dgm:styleLbl>
+  <dgm:styleLbl name="asst1">
+    <dgm:scene3d>
+      <a:camera prst="orthographicFront"/>
+      <a:lightRig rig="threePt" dir="t"/>
+    </dgm:scene3d>
+    <dgm:sp3d/>
+    <dgm:txPr/>
+    <dgm:style>
+      <a:lnRef idx="0">
+        <a:scrgbClr r="0" g="0" b="0"/>
+      </a:lnRef>
+      <a:fillRef idx="3">
+        <a:scrgbClr r="0" g="0" b="0"/>
+      </a:fillRef>
+      <a:effectRef idx="3">
+        <a:scrgbClr r="0" g="0" b="0"/>
+      </a:effectRef>
+      <a:fontRef idx="minor">
+        <a:schemeClr val="lt1"/>
+      </a:fontRef>
+    </dgm:style>
+  </dgm:styleLbl>
+  <dgm:styleLbl name="asst2">
+    <dgm:scene3d>
+      <a:camera prst="orthographicFront"/>
+      <a:lightRig rig="threePt" dir="t"/>
+    </dgm:scene3d>
+    <dgm:sp3d/>
+    <dgm:txPr/>
+    <dgm:style>
+      <a:lnRef idx="0">
+        <a:scrgbClr r="0" g="0" b="0"/>
+      </a:lnRef>
+      <a:fillRef idx="3">
+        <a:scrgbClr r="0" g="0" b="0"/>
+      </a:fillRef>
+      <a:effectRef idx="3">
+        <a:scrgbClr r="0" g="0" b="0"/>
+      </a:effectRef>
+      <a:fontRef idx="minor">
+        <a:schemeClr val="lt1"/>
+      </a:fontRef>
+    </dgm:style>
+  </dgm:styleLbl>
+  <dgm:styleLbl name="asst3">
+    <dgm:scene3d>
+      <a:camera prst="orthographicFront"/>
+      <a:lightRig rig="threePt" dir="t"/>
+    </dgm:scene3d>
+    <dgm:sp3d/>
+    <dgm:txPr/>
+    <dgm:style>
+      <a:lnRef idx="0">
+        <a:scrgbClr r="0" g="0" b="0"/>
+      </a:lnRef>
+      <a:fillRef idx="3">
+        <a:scrgbClr r="0" g="0" b="0"/>
+      </a:fillRef>
+      <a:effectRef idx="3">
+        <a:scrgbClr r="0" g="0" b="0"/>
+      </a:effectRef>
+      <a:fontRef idx="minor">
+        <a:schemeClr val="lt1"/>
+      </a:fontRef>
+    </dgm:style>
+  </dgm:styleLbl>
+  <dgm:styleLbl name="asst4">
+    <dgm:scene3d>
+      <a:camera prst="orthographicFront"/>
+      <a:lightRig rig="threePt" dir="t"/>
+    </dgm:scene3d>
+    <dgm:sp3d/>
+    <dgm:txPr/>
+    <dgm:style>
+      <a:lnRef idx="0">
+        <a:scrgbClr r="0" g="0" b="0"/>
+      </a:lnRef>
+      <a:fillRef idx="3">
+        <a:scrgbClr r="0" g="0" b="0"/>
+      </a:fillRef>
+      <a:effectRef idx="3">
+        <a:scrgbClr r="0" g="0" b="0"/>
+      </a:effectRef>
+      <a:fontRef idx="minor">
+        <a:schemeClr val="lt1"/>
+      </a:fontRef>
+    </dgm:style>
+  </dgm:styleLbl>
+  <dgm:styleLbl name="parChTrans2D1">
+    <dgm:scene3d>
+      <a:camera prst="orthographicFront"/>
+      <a:lightRig rig="threePt" dir="t"/>
+    </dgm:scene3d>
+    <dgm:sp3d/>
+    <dgm:txPr/>
+    <dgm:style>
+      <a:lnRef idx="0">
+        <a:scrgbClr r="0" g="0" b="0"/>
+      </a:lnRef>
+      <a:fillRef idx="3">
+        <a:scrgbClr r="0" g="0" b="0"/>
+      </a:fillRef>
+      <a:effectRef idx="3">
+        <a:scrgbClr r="0" g="0" b="0"/>
+      </a:effectRef>
+      <a:fontRef idx="minor">
+        <a:schemeClr val="lt1"/>
+      </a:fontRef>
+    </dgm:style>
+  </dgm:styleLbl>
+  <dgm:styleLbl name="parChTrans2D2">
+    <dgm:scene3d>
+      <a:camera prst="orthographicFront"/>
+      <a:lightRig rig="threePt" dir="t"/>
+    </dgm:scene3d>
+    <dgm:sp3d/>
+    <dgm:txPr/>
+    <dgm:style>
+      <a:lnRef idx="0">
+        <a:scrgbClr r="0" g="0" b="0"/>
+      </a:lnRef>
+      <a:fillRef idx="3">
+        <a:scrgbClr r="0" g="0" b="0"/>
+      </a:fillRef>
+      <a:effectRef idx="3">
+        <a:scrgbClr r="0" g="0" b="0"/>
+      </a:effectRef>
+      <a:fontRef idx="minor">
+        <a:schemeClr val="lt1"/>
+      </a:fontRef>
+    </dgm:style>
+  </dgm:styleLbl>
+  <dgm:styleLbl name="parChTrans2D3">
+    <dgm:scene3d>
+      <a:camera prst="orthographicFront"/>
+      <a:lightRig rig="threePt" dir="t"/>
+    </dgm:scene3d>
+    <dgm:sp3d/>
+    <dgm:txPr/>
+    <dgm:style>
+      <a:lnRef idx="0">
+        <a:scrgbClr r="0" g="0" b="0"/>
+      </a:lnRef>
+      <a:fillRef idx="3">
+        <a:scrgbClr r="0" g="0" b="0"/>
+      </a:fillRef>
+      <a:effectRef idx="3">
+        <a:scrgbClr r="0" g="0" b="0"/>
+      </a:effectRef>
+      <a:fontRef idx="minor">
+        <a:schemeClr val="lt1"/>
+      </a:fontRef>
+    </dgm:style>
+  </dgm:styleLbl>
+  <dgm:styleLbl name="parChTrans2D4">
+    <dgm:scene3d>
+      <a:camera prst="orthographicFront"/>
+      <a:lightRig rig="threePt" dir="t"/>
+    </dgm:scene3d>
+    <dgm:sp3d/>
+    <dgm:txPr/>
+    <dgm:style>
+      <a:lnRef idx="0">
+        <a:scrgbClr r="0" g="0" b="0"/>
+      </a:lnRef>
+      <a:fillRef idx="3">
+        <a:scrgbClr r="0" g="0" b="0"/>
+      </a:fillRef>
+      <a:effectRef idx="3">
+        <a:scrgbClr r="0" g="0" b="0"/>
+      </a:effectRef>
+      <a:fontRef idx="minor">
+        <a:schemeClr val="lt1"/>
+      </a:fontRef>
+    </dgm:style>
+  </dgm:styleLbl>
+  <dgm:styleLbl name="parChTrans1D1">
+    <dgm:scene3d>
+      <a:camera prst="orthographicFront"/>
+      <a:lightRig rig="threePt" dir="t"/>
+    </dgm:scene3d>
+    <dgm:sp3d/>
+    <dgm:txPr/>
+    <dgm:style>
+      <a:lnRef idx="2">
+        <a:scrgbClr r="0" g="0" b="0"/>
+      </a:lnRef>
+      <a:fillRef idx="0">
+        <a:scrgbClr r="0" g="0" b="0"/>
+      </a:fillRef>
+      <a:effectRef idx="0">
+        <a:scrgbClr r="0" g="0" b="0"/>
+      </a:effectRef>
+      <a:fontRef idx="minor"/>
+    </dgm:style>
+  </dgm:styleLbl>
+  <dgm:styleLbl name="parChTrans1D2">
+    <dgm:scene3d>
+      <a:camera prst="orthographicFront"/>
+      <a:lightRig rig="threePt" dir="t"/>
+    </dgm:scene3d>
+    <dgm:sp3d/>
+    <dgm:txPr/>
+    <dgm:style>
+      <a:lnRef idx="2">
+        <a:scrgbClr r="0" g="0" b="0"/>
+      </a:lnRef>
+      <a:fillRef idx="0">
+        <a:scrgbClr r="0" g="0" b="0"/>
+      </a:fillRef>
+      <a:effectRef idx="0">
+        <a:scrgbClr r="0" g="0" b="0"/>
+      </a:effectRef>
+      <a:fontRef idx="minor"/>
+    </dgm:style>
+  </dgm:styleLbl>
+  <dgm:styleLbl name="parChTrans1D3">
+    <dgm:scene3d>
+      <a:camera prst="orthographicFront"/>
+      <a:lightRig rig="threePt" dir="t"/>
+    </dgm:scene3d>
+    <dgm:sp3d/>
+    <dgm:txPr/>
+    <dgm:style>
+      <a:lnRef idx="2">
+        <a:scrgbClr r="0" g="0" b="0"/>
+      </a:lnRef>
+      <a:fillRef idx="0">
+        <a:scrgbClr r="0" g="0" b="0"/>
+      </a:fillRef>
+      <a:effectRef idx="0">
+        <a:scrgbClr r="0" g="0" b="0"/>
+      </a:effectRef>
+      <a:fontRef idx="minor"/>
+    </dgm:style>
+  </dgm:styleLbl>
+  <dgm:styleLbl name="parChTrans1D4">
+    <dgm:scene3d>
+      <a:camera prst="orthographicFront"/>
+      <a:lightRig rig="threePt" dir="t"/>
+    </dgm:scene3d>
+    <dgm:sp3d/>
+    <dgm:txPr/>
+    <dgm:style>
+      <a:lnRef idx="2">
+        <a:scrgbClr r="0" g="0" b="0"/>
+      </a:lnRef>
+      <a:fillRef idx="0">
+        <a:scrgbClr r="0" g="0" b="0"/>
+      </a:fillRef>
+      <a:effectRef idx="0">
+        <a:scrgbClr r="0" g="0" b="0"/>
+      </a:effectRef>
+      <a:fontRef idx="minor"/>
+    </dgm:style>
+  </dgm:styleLbl>
+  <dgm:styleLbl name="fgAcc1">
+    <dgm:scene3d>
+      <a:camera prst="orthographicFront"/>
+      <a:lightRig rig="threePt" dir="t"/>
+    </dgm:scene3d>
+    <dgm:sp3d/>
+    <dgm:txPr/>
+    <dgm:style>
+      <a:lnRef idx="1">
+        <a:scrgbClr r="0" g="0" b="0"/>
+      </a:lnRef>
+      <a:fillRef idx="1">
+        <a:scrgbClr r="0" g="0" b="0"/>
+      </a:fillRef>
+      <a:effectRef idx="2">
+        <a:scrgbClr r="0" g="0" b="0"/>
+      </a:effectRef>
+      <a:fontRef idx="minor"/>
+    </dgm:style>
+  </dgm:styleLbl>
+  <dgm:styleLbl name="conFgAcc1">
+    <dgm:scene3d>
+      <a:camera prst="orthographicFront"/>
+      <a:lightRig rig="threePt" dir="t"/>
+    </dgm:scene3d>
+    <dgm:sp3d/>
+    <dgm:txPr/>
+    <dgm:style>
+      <a:lnRef idx="1">
+        <a:scrgbClr r="0" g="0" b="0"/>
+      </a:lnRef>
+      <a:fillRef idx="1">
+        <a:scrgbClr r="0" g="0" b="0"/>
+      </a:fillRef>
+      <a:effectRef idx="2">
+        <a:scrgbClr r="0" g="0" b="0"/>
+      </a:effectRef>
+      <a:fontRef idx="minor"/>
+    </dgm:style>
+  </dgm:styleLbl>
+  <dgm:styleLbl name="alignAcc1">
+    <dgm:scene3d>
+      <a:camera prst="orthographicFront"/>
+      <a:lightRig rig="threePt" dir="t"/>
+    </dgm:scene3d>
+    <dgm:sp3d/>
+    <dgm:txPr/>
+    <dgm:style>
+      <a:lnRef idx="1">
+        <a:scrgbClr r="0" g="0" b="0"/>
+      </a:lnRef>
+      <a:fillRef idx="1">
+        <a:scrgbClr r="0" g="0" b="0"/>
+      </a:fillRef>
+      <a:effectRef idx="2">
+        <a:scrgbClr r="0" g="0" b="0"/>
+      </a:effectRef>
+      <a:fontRef idx="minor"/>
+    </dgm:style>
+  </dgm:styleLbl>
+  <dgm:styleLbl name="trAlignAcc1">
+    <dgm:scene3d>
+      <a:camera prst="orthographicFront"/>
+      <a:lightRig rig="threePt" dir="t"/>
+    </dgm:scene3d>
+    <dgm:sp3d/>
+    <dgm:txPr/>
+    <dgm:style>
+      <a:lnRef idx="1">
+        <a:scrgbClr r="0" g="0" b="0"/>
+      </a:lnRef>
+      <a:fillRef idx="1">
+        <a:scrgbClr r="0" g="0" b="0"/>
+      </a:fillRef>
+      <a:effectRef idx="0">
+        <a:scrgbClr r="0" g="0" b="0"/>
+      </a:effectRef>
+      <a:fontRef idx="minor"/>
+    </dgm:style>
+  </dgm:styleLbl>
+  <dgm:styleLbl name="bgAcc1">
+    <dgm:scene3d>
+      <a:camera prst="orthographicFront"/>
+      <a:lightRig rig="threePt" dir="t"/>
+    </dgm:scene3d>
+    <dgm:sp3d/>
+    <dgm:txPr/>
+    <dgm:style>
+      <a:lnRef idx="1">
+        <a:scrgbClr r="0" g="0" b="0"/>
+      </a:lnRef>
+      <a:fillRef idx="1">
+        <a:scrgbClr r="0" g="0" b="0"/>
+      </a:fillRef>
+      <a:effectRef idx="2">
+        <a:scrgbClr r="0" g="0" b="0"/>
+      </a:effectRef>
+      <a:fontRef idx="minor"/>
+    </dgm:style>
+  </dgm:styleLbl>
+  <dgm:styleLbl name="solidFgAcc1">
+    <dgm:scene3d>
+      <a:camera prst="orthographicFront"/>
+      <a:lightRig rig="threePt" dir="t"/>
+    </dgm:scene3d>
+    <dgm:sp3d/>
+    <dgm:txPr/>
+    <dgm:style>
+      <a:lnRef idx="1">
+        <a:scrgbClr r="0" g="0" b="0"/>
+      </a:lnRef>
+      <a:fillRef idx="1">
+        <a:scrgbClr r="0" g="0" b="0"/>
+      </a:fillRef>
+      <a:effectRef idx="2">
+        <a:scrgbClr r="0" g="0" b="0"/>
+      </a:effectRef>
+      <a:fontRef idx="minor"/>
+    </dgm:style>
+  </dgm:styleLbl>
+  <dgm:styleLbl name="solidAlignAcc1">
+    <dgm:scene3d>
+      <a:camera prst="orthographicFront"/>
+      <a:lightRig rig="threePt" dir="t"/>
+    </dgm:scene3d>
+    <dgm:sp3d/>
+    <dgm:txPr/>
+    <dgm:style>
+      <a:lnRef idx="1">
+        <a:scrgbClr r="0" g="0" b="0"/>
+      </a:lnRef>
+      <a:fillRef idx="1">
+        <a:scrgbClr r="0" g="0" b="0"/>
+      </a:fillRef>
+      <a:effectRef idx="3">
+        <a:scrgbClr r="0" g="0" b="0"/>
+      </a:effectRef>
+      <a:fontRef idx="minor"/>
+    </dgm:style>
+  </dgm:styleLbl>
+  <dgm:styleLbl name="solidBgAcc1">
+    <dgm:scene3d>
+      <a:camera prst="orthographicFront"/>
+      <a:lightRig rig="threePt" dir="t"/>
+    </dgm:scene3d>
+    <dgm:sp3d/>
+    <dgm:txPr/>
+    <dgm:style>
+      <a:lnRef idx="1">
+        <a:scrgbClr r="0" g="0" b="0"/>
+      </a:lnRef>
+      <a:fillRef idx="1">
+        <a:scrgbClr r="0" g="0" b="0"/>
+      </a:fillRef>
+      <a:effectRef idx="3">
+        <a:scrgbClr r="0" g="0" b="0"/>
+      </a:effectRef>
+      <a:fontRef idx="minor"/>
+    </dgm:style>
+  </dgm:styleLbl>
+  <dgm:styleLbl name="fgAccFollowNode1">
+    <dgm:scene3d>
+      <a:camera prst="orthographicFront"/>
+      <a:lightRig rig="threePt" dir="t"/>
+    </dgm:scene3d>
+    <dgm:sp3d/>
+    <dgm:txPr/>
+    <dgm:style>
+      <a:lnRef idx="1">
+        <a:scrgbClr r="0" g="0" b="0"/>
+      </a:lnRef>
+      <a:fillRef idx="1">
+        <a:scrgbClr r="0" g="0" b="0"/>
+      </a:fillRef>
+      <a:effectRef idx="2">
+        <a:scrgbClr r="0" g="0" b="0"/>
+      </a:effectRef>
+      <a:fontRef idx="minor"/>
+    </dgm:style>
+  </dgm:styleLbl>
+  <dgm:styleLbl name="alignAccFollowNode1">
+    <dgm:scene3d>
+      <a:camera prst="orthographicFront"/>
+      <a:lightRig rig="threePt" dir="t"/>
+    </dgm:scene3d>
+    <dgm:sp3d/>
+    <dgm:txPr/>
+    <dgm:style>
+      <a:lnRef idx="1">
+        <a:scrgbClr r="0" g="0" b="0"/>
+      </a:lnRef>
+      <a:fillRef idx="1">
+        <a:scrgbClr r="0" g="0" b="0"/>
+      </a:fillRef>
+      <a:effectRef idx="2">
+        <a:scrgbClr r="0" g="0" b="0"/>
+      </a:effectRef>
+      <a:fontRef idx="minor"/>
+    </dgm:style>
+  </dgm:styleLbl>
+  <dgm:styleLbl name="bgAccFollowNode1">
+    <dgm:scene3d>
+      <a:camera prst="orthographicFront"/>
+      <a:lightRig rig="threePt" dir="t"/>
+    </dgm:scene3d>
+    <dgm:sp3d/>
+    <dgm:txPr/>
+    <dgm:style>
+      <a:lnRef idx="1">
+        <a:scrgbClr r="0" g="0" b="0"/>
+      </a:lnRef>
+      <a:fillRef idx="1">
+        <a:scrgbClr r="0" g="0" b="0"/>
+      </a:fillRef>
+      <a:effectRef idx="2">
+        <a:scrgbClr r="0" g="0" b="0"/>
+      </a:effectRef>
+      <a:fontRef idx="minor"/>
+    </dgm:style>
+  </dgm:styleLbl>
+  <dgm:styleLbl name="fgAcc0">
+    <dgm:scene3d>
+      <a:camera prst="orthographicFront"/>
+      <a:lightRig rig="threePt" dir="t"/>
+    </dgm:scene3d>
+    <dgm:sp3d/>
+    <dgm:txPr/>
+    <dgm:style>
+      <a:lnRef idx="1">
+        <a:scrgbClr r="0" g="0" b="0"/>
+      </a:lnRef>
+      <a:fillRef idx="1">
+        <a:scrgbClr r="0" g="0" b="0"/>
+      </a:fillRef>
+      <a:effectRef idx="2">
+        <a:scrgbClr r="0" g="0" b="0"/>
+      </a:effectRef>
+      <a:fontRef idx="minor"/>
+    </dgm:style>
+  </dgm:styleLbl>
+  <dgm:styleLbl name="fgAcc2">
+    <dgm:scene3d>
+      <a:camera prst="orthographicFront"/>
+      <a:lightRig rig="threePt" dir="t"/>
+    </dgm:scene3d>
+    <dgm:sp3d/>
+    <dgm:txPr/>
+    <dgm:style>
+      <a:lnRef idx="1">
+        <a:scrgbClr r="0" g="0" b="0"/>
+      </a:lnRef>
+      <a:fillRef idx="1">
+        <a:scrgbClr r="0" g="0" b="0"/>
+      </a:fillRef>
+      <a:effectRef idx="2">
+        <a:scrgbClr r="0" g="0" b="0"/>
+      </a:effectRef>
+      <a:fontRef idx="minor"/>
+    </dgm:style>
+  </dgm:styleLbl>
+  <dgm:styleLbl name="fgAcc3">
+    <dgm:scene3d>
+      <a:camera prst="orthographicFront"/>
+      <a:lightRig rig="threePt" dir="t"/>
+    </dgm:scene3d>
+    <dgm:sp3d/>
+    <dgm:txPr/>
+    <dgm:style>
+      <a:lnRef idx="1">
+        <a:scrgbClr r="0" g="0" b="0"/>
+      </a:lnRef>
+      <a:fillRef idx="1">
+        <a:scrgbClr r="0" g="0" b="0"/>
+      </a:fillRef>
+      <a:effectRef idx="2">
+        <a:scrgbClr r="0" g="0" b="0"/>
+      </a:effectRef>
+      <a:fontRef idx="minor"/>
+    </dgm:style>
+  </dgm:styleLbl>
+  <dgm:styleLbl name="fgAcc4">
+    <dgm:scene3d>
+      <a:camera prst="orthographicFront"/>
+      <a:lightRig rig="threePt" dir="t"/>
+    </dgm:scene3d>
+    <dgm:sp3d/>
+    <dgm:txPr/>
+    <dgm:style>
+      <a:lnRef idx="1">
+        <a:scrgbClr r="0" g="0" b="0"/>
+      </a:lnRef>
+      <a:fillRef idx="1">
+        <a:scrgbClr r="0" g="0" b="0"/>
+      </a:fillRef>
+      <a:effectRef idx="2">
+        <a:scrgbClr r="0" g="0" b="0"/>
+      </a:effectRef>
+      <a:fontRef idx="minor"/>
+    </dgm:style>
+  </dgm:styleLbl>
+  <dgm:styleLbl name="bgShp">
+    <dgm:scene3d>
+      <a:camera prst="orthographicFront"/>
+      <a:lightRig rig="threePt" dir="t"/>
+    </dgm:scene3d>
+    <dgm:sp3d/>
+    <dgm:txPr/>
+    <dgm:style>
+      <a:lnRef idx="0">
+        <a:scrgbClr r="0" g="0" b="0"/>
+      </a:lnRef>
+      <a:fillRef idx="1">
+        <a:scrgbClr r="0" g="0" b="0"/>
+      </a:fillRef>
+      <a:effectRef idx="2">
+        <a:scrgbClr r="0" g="0" b="0"/>
+      </a:effectRef>
+      <a:fontRef idx="minor"/>
+    </dgm:style>
+  </dgm:styleLbl>
+  <dgm:styleLbl name="dkBgShp">
+    <dgm:scene3d>
+      <a:camera prst="orthographicFront"/>
+      <a:lightRig rig="threePt" dir="t"/>
+    </dgm:scene3d>
+    <dgm:sp3d/>
+    <dgm:txPr/>
+    <dgm:style>
+      <a:lnRef idx="0">
+        <a:scrgbClr r="0" g="0" b="0"/>
+      </a:lnRef>
+      <a:fillRef idx="1">
+        <a:scrgbClr r="0" g="0" b="0"/>
+      </a:fillRef>
+      <a:effectRef idx="3">
+        <a:scrgbClr r="0" g="0" b="0"/>
+      </a:effectRef>
+      <a:fontRef idx="minor"/>
+    </dgm:style>
+  </dgm:styleLbl>
+  <dgm:styleLbl name="trBgShp">
+    <dgm:scene3d>
+      <a:camera prst="orthographicFront"/>
+      <a:lightRig rig="threePt" dir="t"/>
+    </dgm:scene3d>
+    <dgm:sp3d/>
+    <dgm:txPr/>
+    <dgm:style>
+      <a:lnRef idx="0">
+        <a:scrgbClr r="0" g="0" b="0"/>
+      </a:lnRef>
+      <a:fillRef idx="1">
+        <a:scrgbClr r="0" g="0" b="0"/>
+      </a:fillRef>
+      <a:effectRef idx="0">
+        <a:scrgbClr r="0" g="0" b="0"/>
+      </a:effectRef>
+      <a:fontRef idx="minor"/>
+    </dgm:style>
+  </dgm:styleLbl>
+  <dgm:styleLbl name="fgShp">
+    <dgm:scene3d>
+      <a:camera prst="orthographicFront"/>
+      <a:lightRig rig="threePt" dir="t"/>
+    </dgm:scene3d>
+    <dgm:sp3d/>
+    <dgm:txPr/>
+    <dgm:style>
+      <a:lnRef idx="0">
+        <a:scrgbClr r="0" g="0" b="0"/>
+      </a:lnRef>
+      <a:fillRef idx="3">
+        <a:scrgbClr r="0" g="0" b="0"/>
+      </a:fillRef>
+      <a:effectRef idx="3">
+        <a:scrgbClr r="0" g="0" b="0"/>
+      </a:effectRef>
+      <a:fontRef idx="minor"/>
+    </dgm:style>
+  </dgm:styleLbl>
+  <dgm:styleLbl name="revTx">
+    <dgm:scene3d>
+      <a:camera prst="orthographicFront"/>
+      <a:lightRig rig="threePt" dir="t"/>
+    </dgm:scene3d>
+    <dgm:sp3d/>
+    <dgm:txPr/>
+    <dgm:style>
+      <a:lnRef idx="0">
+        <a:scrgbClr r="0" g="0" b="0"/>
+      </a:lnRef>
+      <a:fillRef idx="0">
+        <a:scrgbClr r="0" g="0" b="0"/>
+      </a:fillRef>
+      <a:effectRef idx="0">
+        <a:scrgbClr r="0" g="0" b="0"/>
+      </a:effectRef>
+      <a:fontRef idx="minor"/>
+    </dgm:style>
+  </dgm:styleLbl>
+</dgm:styleDef>
+</file>
+
+<file path=ppt/diagrams/quickStyle15.xml><?xml version="1.0" encoding="utf-8"?>
 <dgm:styleDef xmlns:dgm="http://schemas.openxmlformats.org/drawingml/2006/diagram" xmlns:a="http://schemas.openxmlformats.org/drawingml/2006/main" uniqueId="urn:microsoft.com/office/officeart/2005/8/quickstyle/simple1">
   <dgm:title val=""/>
   <dgm:desc val=""/>
@@ -42811,7 +45376,7 @@
             <a:fld id="{C590261E-DED2-4ECB-93F0-6041BFF84361}" type="datetimeFigureOut">
               <a:rPr lang="en-US" smtClean="0"/>
               <a:pPr/>
-              <a:t>8/29/2022</a:t>
+              <a:t>10/18/2022</a:t>
             </a:fld>
             <a:endParaRPr lang="en-US"/>
           </a:p>
@@ -44708,6 +47273,93 @@
         </p:nvSpPr>
         <p:spPr/>
         <p:txBody>
+          <a:bodyPr>
+            <a:normAutofit/>
+          </a:bodyPr>
+          <a:lstStyle/>
+          <a:p>
+            <a:endParaRPr lang="en-US" dirty="0"/>
+          </a:p>
+        </p:txBody>
+      </p:sp>
+      <p:sp>
+        <p:nvSpPr>
+          <p:cNvPr id="4" name="Slide Number Placeholder 3"/>
+          <p:cNvSpPr>
+            <a:spLocks noGrp="1"/>
+          </p:cNvSpPr>
+          <p:nvPr>
+            <p:ph type="sldNum" sz="quarter" idx="10"/>
+          </p:nvPr>
+        </p:nvSpPr>
+        <p:spPr/>
+        <p:txBody>
+          <a:bodyPr/>
+          <a:lstStyle/>
+          <a:p>
+            <a:fld id="{2754576A-F041-465B-B05C-90CC0BF4FA50}" type="slidenum">
+              <a:rPr lang="en-US" smtClean="0"/>
+              <a:pPr/>
+              <a:t>34</a:t>
+            </a:fld>
+            <a:endParaRPr lang="en-US"/>
+          </a:p>
+        </p:txBody>
+      </p:sp>
+    </p:spTree>
+    <p:extLst>
+      <p:ext uri="{BB962C8B-B14F-4D97-AF65-F5344CB8AC3E}">
+        <p14:creationId xmlns:p14="http://schemas.microsoft.com/office/powerpoint/2010/main" val="1633096704"/>
+      </p:ext>
+    </p:extLst>
+  </p:cSld>
+  <p:clrMapOvr>
+    <a:masterClrMapping/>
+  </p:clrMapOvr>
+</p:notes>
+</file>
+
+<file path=ppt/notesSlides/notesSlide28.xml><?xml version="1.0" encoding="utf-8"?>
+<p:notes xmlns:a="http://schemas.openxmlformats.org/drawingml/2006/main" xmlns:r="http://schemas.openxmlformats.org/officeDocument/2006/relationships" xmlns:p="http://schemas.openxmlformats.org/presentationml/2006/main">
+  <p:cSld>
+    <p:spTree>
+      <p:nvGrpSpPr>
+        <p:cNvPr id="1" name=""/>
+        <p:cNvGrpSpPr/>
+        <p:nvPr/>
+      </p:nvGrpSpPr>
+      <p:grpSpPr>
+        <a:xfrm>
+          <a:off x="0" y="0"/>
+          <a:ext cx="0" cy="0"/>
+          <a:chOff x="0" y="0"/>
+          <a:chExt cx="0" cy="0"/>
+        </a:xfrm>
+      </p:grpSpPr>
+      <p:sp>
+        <p:nvSpPr>
+          <p:cNvPr id="2" name="Slide Image Placeholder 1"/>
+          <p:cNvSpPr>
+            <a:spLocks noGrp="1" noRot="1" noChangeAspect="1"/>
+          </p:cNvSpPr>
+          <p:nvPr>
+            <p:ph type="sldImg"/>
+          </p:nvPr>
+        </p:nvSpPr>
+        <p:spPr/>
+      </p:sp>
+      <p:sp>
+        <p:nvSpPr>
+          <p:cNvPr id="3" name="Notes Placeholder 2"/>
+          <p:cNvSpPr>
+            <a:spLocks noGrp="1"/>
+          </p:cNvSpPr>
+          <p:nvPr>
+            <p:ph type="body" idx="1"/>
+          </p:nvPr>
+        </p:nvSpPr>
+        <p:spPr/>
+        <p:txBody>
           <a:bodyPr/>
           <a:lstStyle/>
           <a:p>
@@ -44733,7 +47385,7 @@
             <a:fld id="{2754576A-F041-465B-B05C-90CC0BF4FA50}" type="slidenum">
               <a:rPr lang="en-US" smtClean="0"/>
               <a:pPr/>
-              <a:t>34</a:t>
+              <a:t>35</a:t>
             </a:fld>
             <a:endParaRPr lang="en-US"/>
           </a:p>
@@ -52369,17 +55021,29 @@
             <p:ph idx="1"/>
           </p:nvPr>
         </p:nvSpPr>
-        <p:spPr/>
+        <p:spPr>
+          <a:xfrm>
+            <a:off x="628650" y="1524001"/>
+            <a:ext cx="7886700" cy="1219199"/>
+          </a:xfrm>
+        </p:spPr>
         <p:txBody>
-          <a:bodyPr/>
+          <a:bodyPr>
+            <a:normAutofit fontScale="92500" lnSpcReduction="20000"/>
+          </a:bodyPr>
           <a:lstStyle/>
           <a:p>
-            <a:pPr marL="0" indent="0">
-              <a:buNone/>
-            </a:pPr>
+            <a:r>
+              <a:rPr lang="en-US" b="1" dirty="0">
+                <a:solidFill>
+                  <a:srgbClr val="FF0000"/>
+                </a:solidFill>
+              </a:rPr>
+              <a:t>Rules</a:t>
+            </a:r>
             <a:r>
               <a:rPr lang="en-US" dirty="0"/>
-              <a:t>Rules select action only  </a:t>
+              <a:t> select action only  </a:t>
             </a:r>
             <a:r>
               <a:rPr lang="en-US" b="1" dirty="0">
@@ -52387,11 +55051,28 @@
                   <a:srgbClr val="FF0000"/>
                 </a:solidFill>
               </a:rPr>
-              <a:t>based on current percept</a:t>
+              <a:t>based on current percept. </a:t>
             </a:r>
             <a:r>
               <a:rPr lang="en-US" dirty="0"/>
-              <a:t>, ignoring all past percepts (no memory). This is typically very fast!</a:t>
+              <a:t>This is typically very fast!</a:t>
+            </a:r>
+            <a:endParaRPr lang="en-US" b="1" dirty="0">
+              <a:solidFill>
+                <a:srgbClr val="FF0000"/>
+              </a:solidFill>
+            </a:endParaRPr>
+          </a:p>
+          <a:p>
+            <a:r>
+              <a:rPr lang="en-US" dirty="0"/>
+              <a:t>The agent does not know about the performance measure, but well-designed rules can lead to good performance.</a:t>
+            </a:r>
+          </a:p>
+          <a:p>
+            <a:r>
+              <a:rPr lang="en-US" dirty="0"/>
+              <a:t>It has no memory and thus ignores all past percepts.</a:t>
             </a:r>
           </a:p>
         </p:txBody>
@@ -52410,8 +55091,8 @@
         </p:nvSpPr>
         <p:spPr>
           <a:xfrm>
-            <a:off x="405085" y="6159150"/>
-            <a:ext cx="7886700" cy="369332"/>
+            <a:off x="405084" y="6159150"/>
+            <a:ext cx="8110265" cy="369332"/>
           </a:xfrm>
           <a:prstGeom prst="rect">
             <a:avLst/>
@@ -52429,7 +55110,7 @@
             </a:r>
             <a:r>
               <a:rPr lang="en-US" dirty="0"/>
-              <a:t>: simple, rule-based  vacuum cleaner from before. </a:t>
+              <a:t>: A simple vacuum cleaner that uses rules based on its current sensor input. </a:t>
             </a:r>
           </a:p>
         </p:txBody>
@@ -52524,19 +55205,18 @@
         <p:spPr>
           <a:xfrm>
             <a:off x="628650" y="1447800"/>
-            <a:ext cx="7886700" cy="4351338"/>
+            <a:ext cx="7886700" cy="1103903"/>
           </a:xfrm>
         </p:spPr>
         <p:txBody>
-          <a:bodyPr/>
+          <a:bodyPr>
+            <a:normAutofit fontScale="92500"/>
+          </a:bodyPr>
           <a:lstStyle/>
           <a:p>
-            <a:pPr marL="0" indent="0">
-              <a:buNone/>
-            </a:pPr>
             <a:r>
               <a:rPr lang="en-US" dirty="0"/>
-              <a:t>Maintains </a:t>
+              <a:t>Maintains an </a:t>
             </a:r>
             <a:r>
               <a:rPr lang="en-US" b="1" dirty="0">
@@ -52548,7 +55228,13 @@
             </a:r>
             <a:r>
               <a:rPr lang="en-US" dirty="0"/>
-              <a:t>(memory) to keeps track of aspects of the environment that cannot be currently observed. There is now more information for the rules to making decisions. </a:t>
+              <a:t>(memory) to keeps track of aspects of the environment that cannot be currently observed. </a:t>
+            </a:r>
+          </a:p>
+          <a:p>
+            <a:r>
+              <a:rPr lang="en-US" dirty="0"/>
+              <a:t>There is now more information for the rules to make better decisions. </a:t>
             </a:r>
             <a:endParaRPr lang="en-US" sz="2000" dirty="0"/>
           </a:p>
@@ -52587,7 +55273,7 @@
             </a:r>
             <a:r>
               <a:rPr lang="en-US" dirty="0"/>
-              <a:t>: simple, vacuum cleaner that remembers were it has already cleaned. </a:t>
+              <a:t>: A vacuum cleaner that remembers were it has already cleaned.</a:t>
             </a:r>
           </a:p>
         </p:txBody>
@@ -54301,20 +56987,19 @@
         </p:nvSpPr>
         <p:spPr>
           <a:xfrm>
-            <a:off x="628650" y="1786731"/>
-            <a:ext cx="7886700" cy="4351338"/>
+            <a:off x="628650" y="1447801"/>
+            <a:ext cx="7886700" cy="1325563"/>
           </a:xfrm>
         </p:spPr>
         <p:txBody>
-          <a:bodyPr/>
+          <a:bodyPr>
+            <a:normAutofit lnSpcReduction="10000"/>
+          </a:bodyPr>
           <a:lstStyle/>
           <a:p>
-            <a:pPr marL="0" indent="0">
-              <a:buNone/>
-            </a:pPr>
             <a:r>
               <a:rPr lang="en-US" dirty="0"/>
-              <a:t>The agent chooses actions in the current state to reach a </a:t>
+              <a:t>The agent has the task to reach a defined </a:t>
             </a:r>
             <a:r>
               <a:rPr lang="en-US" b="1" dirty="0">
@@ -54322,23 +57007,17 @@
                   <a:srgbClr val="FF0000"/>
                 </a:solidFill>
               </a:rPr>
-              <a:t>goal state </a:t>
+              <a:t>goal state</a:t>
             </a:r>
             <a:r>
               <a:rPr lang="en-US" dirty="0"/>
-              <a:t>as fast as possible.</a:t>
+              <a:t>. </a:t>
             </a:r>
-            <a:r>
-              <a:rPr lang="en-US" b="1" dirty="0">
-                <a:solidFill>
-                  <a:srgbClr val="FF0000"/>
-                </a:solidFill>
-              </a:rPr>
-              <a:t>  </a:t>
-            </a:r>
+          </a:p>
+          <a:p>
             <a:r>
               <a:rPr lang="en-US" dirty="0"/>
-              <a:t>We need </a:t>
+              <a:t>The agent needs to move towards the goal. It can use </a:t>
             </a:r>
             <a:r>
               <a:rPr lang="en-US" b="1" dirty="0">
@@ -54350,7 +57029,21 @@
             </a:r>
             <a:r>
               <a:rPr lang="en-US" dirty="0"/>
-              <a:t>to find action sequences that reach that goal.</a:t>
+              <a:t>to plan actions that lead to the goal.</a:t>
+            </a:r>
+          </a:p>
+          <a:p>
+            <a:r>
+              <a:rPr lang="en-US" dirty="0"/>
+              <a:t>The performance measure is typically the cost to reach the goal.</a:t>
+            </a:r>
+            <a:r>
+              <a:rPr lang="en-US" b="1" dirty="0">
+                <a:solidFill>
+                  <a:srgbClr val="FF0000"/>
+                </a:solidFill>
+              </a:rPr>
+              <a:t>  </a:t>
             </a:r>
           </a:p>
         </p:txBody>
@@ -54628,14 +57321,16 @@
             <p:ph idx="1"/>
           </p:nvPr>
         </p:nvSpPr>
-        <p:spPr/>
+        <p:spPr>
+          <a:xfrm>
+            <a:off x="628650" y="1447800"/>
+            <a:ext cx="7886700" cy="1485753"/>
+          </a:xfrm>
+        </p:spPr>
         <p:txBody>
           <a:bodyPr/>
           <a:lstStyle/>
           <a:p>
-            <a:pPr marL="0" indent="0">
-              <a:buNone/>
-            </a:pPr>
             <a:r>
               <a:rPr lang="en-US" dirty="0"/>
               <a:t>The agent uses a utility function to evaluate the </a:t>
@@ -54646,11 +57341,13 @@
                   <a:srgbClr val="FF0000"/>
                 </a:solidFill>
               </a:rPr>
-              <a:t>desirability of different states. </a:t>
+              <a:t>desirability of each different states. </a:t>
             </a:r>
+          </a:p>
+          <a:p>
             <a:r>
               <a:rPr lang="en-US" dirty="0"/>
-              <a:t>Choose the action to maximize expected utility over time (i.e., stay in desirable states).</a:t>
+              <a:t>Performance measure: Choose actions to maximize expected utility over time (i.e., stay in desirable states).</a:t>
             </a:r>
           </a:p>
           <a:p>
@@ -54726,7 +57423,7 @@
         </p:nvSpPr>
         <p:spPr>
           <a:xfrm>
-            <a:off x="609600" y="6148955"/>
+            <a:off x="457200" y="6187025"/>
             <a:ext cx="8536311" cy="369332"/>
           </a:xfrm>
           <a:prstGeom prst="rect">
@@ -56170,13 +58867,13 @@
             <p:ph idx="1"/>
             <p:extLst>
               <p:ext uri="{D42A27DB-BD31-4B8C-83A1-F6EECF244321}">
-                <p14:modId xmlns:p14="http://schemas.microsoft.com/office/powerpoint/2010/main" val="3244387006"/>
+                <p14:modId xmlns:p14="http://schemas.microsoft.com/office/powerpoint/2010/main" val="1419535315"/>
               </p:ext>
             </p:extLst>
           </p:nvPr>
         </p:nvGraphicFramePr>
         <p:xfrm>
-          <a:off x="628650" y="1825625"/>
+          <a:off x="628650" y="1447800"/>
           <a:ext cx="7886700" cy="4351338"/>
         </p:xfrm>
         <a:graphic>
@@ -56199,7 +58896,7 @@
         </p:nvSpPr>
         <p:spPr>
           <a:xfrm>
-            <a:off x="5410200" y="5117068"/>
+            <a:off x="5410200" y="4739243"/>
             <a:ext cx="2771721" cy="369332"/>
           </a:xfrm>
           <a:prstGeom prst="rect">
@@ -56234,8 +58931,8 @@
         </p:nvSpPr>
         <p:spPr>
           <a:xfrm>
-            <a:off x="5410200" y="3953470"/>
-            <a:ext cx="2819400" cy="923330"/>
+            <a:off x="5416378" y="3526233"/>
+            <a:ext cx="3200400" cy="923330"/>
           </a:xfrm>
           <a:prstGeom prst="rect">
             <a:avLst/>
@@ -56250,7 +58947,7 @@
           <a:p>
             <a:r>
               <a:rPr lang="en-US" dirty="0"/>
-              <a:t>Does it use states. How would they be defined (atomic/factored)?</a:t>
+              <a:t>Does it store state information. How would they be defined (atomic/factored)?</a:t>
             </a:r>
           </a:p>
         </p:txBody>
@@ -56269,7 +58966,7 @@
         </p:nvSpPr>
         <p:spPr>
           <a:xfrm>
-            <a:off x="5410200" y="3364468"/>
+            <a:off x="5410200" y="2892927"/>
             <a:ext cx="2819400" cy="369332"/>
           </a:xfrm>
           <a:prstGeom prst="rect">
@@ -56304,8 +59001,8 @@
         </p:nvSpPr>
         <p:spPr>
           <a:xfrm>
-            <a:off x="5410200" y="2325469"/>
-            <a:ext cx="2819400" cy="646331"/>
+            <a:off x="5410200" y="1776175"/>
+            <a:ext cx="3105150" cy="923330"/>
           </a:xfrm>
           <a:prstGeom prst="rect">
             <a:avLst/>
@@ -56320,7 +59017,7 @@
           <a:p>
             <a:r>
               <a:rPr lang="en-US" dirty="0"/>
-              <a:t>How would the utility be defined?</a:t>
+              <a:t>Does it collect utility over time? How would the utility for each state be defined?</a:t>
             </a:r>
           </a:p>
         </p:txBody>
@@ -56339,7 +59036,7 @@
         </p:nvSpPr>
         <p:spPr>
           <a:xfrm rot="16200000">
-            <a:off x="221343" y="3724870"/>
+            <a:off x="221343" y="3347045"/>
             <a:ext cx="3367314" cy="457200"/>
           </a:xfrm>
           <a:prstGeom prst="rect">
@@ -56391,6 +59088,365 @@
 </file>
 
 <file path=ppt/slides/slide34.xml><?xml version="1.0" encoding="utf-8"?>
+<p:sld xmlns:a="http://schemas.openxmlformats.org/drawingml/2006/main" xmlns:r="http://schemas.openxmlformats.org/officeDocument/2006/relationships" xmlns:p="http://schemas.openxmlformats.org/presentationml/2006/main">
+  <p:cSld>
+    <p:spTree>
+      <p:nvGrpSpPr>
+        <p:cNvPr id="1" name=""/>
+        <p:cNvGrpSpPr/>
+        <p:nvPr/>
+      </p:nvGrpSpPr>
+      <p:grpSpPr>
+        <a:xfrm>
+          <a:off x="0" y="0"/>
+          <a:ext cx="0" cy="0"/>
+          <a:chOff x="0" y="0"/>
+          <a:chExt cx="0" cy="0"/>
+        </a:xfrm>
+      </p:grpSpPr>
+      <p:sp>
+        <p:nvSpPr>
+          <p:cNvPr id="23554" name="Rectangle 2"/>
+          <p:cNvSpPr>
+            <a:spLocks noGrp="1" noChangeArrowheads="1"/>
+          </p:cNvSpPr>
+          <p:nvPr>
+            <p:ph type="title"/>
+          </p:nvPr>
+        </p:nvSpPr>
+        <p:spPr>
+          <a:xfrm>
+            <a:off x="628650" y="365126"/>
+            <a:ext cx="7886700" cy="1939037"/>
+          </a:xfrm>
+        </p:spPr>
+        <p:txBody>
+          <a:bodyPr>
+            <a:normAutofit/>
+          </a:bodyPr>
+          <a:lstStyle/>
+          <a:p>
+            <a:r>
+              <a:rPr lang="en-US" dirty="0"/>
+              <a:t>Intelligent Systems as </a:t>
+            </a:r>
+            <a:br>
+              <a:rPr lang="en-US" dirty="0"/>
+            </a:br>
+            <a:r>
+              <a:rPr lang="en-US" dirty="0"/>
+              <a:t>Sets of Agents:</a:t>
+            </a:r>
+            <a:br>
+              <a:rPr lang="en-US" dirty="0"/>
+            </a:br>
+            <a:r>
+              <a:rPr lang="en-US" dirty="0"/>
+              <a:t>Self-driving Car</a:t>
+            </a:r>
+          </a:p>
+        </p:txBody>
+      </p:sp>
+      <p:graphicFrame>
+        <p:nvGraphicFramePr>
+          <p:cNvPr id="2" name="Content Placeholder 1">
+            <a:extLst>
+              <a:ext uri="{FF2B5EF4-FFF2-40B4-BE49-F238E27FC236}">
+                <a16:creationId xmlns:a16="http://schemas.microsoft.com/office/drawing/2014/main" id="{22A48921-D15F-4F33-808F-C00BAA1FDF19}"/>
+              </a:ext>
+            </a:extLst>
+          </p:cNvPr>
+          <p:cNvGraphicFramePr>
+            <a:graphicFrameLocks noGrp="1"/>
+          </p:cNvGraphicFramePr>
+          <p:nvPr>
+            <p:ph idx="1"/>
+            <p:extLst>
+              <p:ext uri="{D42A27DB-BD31-4B8C-83A1-F6EECF244321}">
+                <p14:modId xmlns:p14="http://schemas.microsoft.com/office/powerpoint/2010/main" val="3711007976"/>
+              </p:ext>
+            </p:extLst>
+          </p:nvPr>
+        </p:nvGraphicFramePr>
+        <p:xfrm>
+          <a:off x="290540" y="2735262"/>
+          <a:ext cx="6034060" cy="3513138"/>
+        </p:xfrm>
+        <a:graphic>
+          <a:graphicData uri="http://schemas.openxmlformats.org/drawingml/2006/diagram">
+            <dgm:relIds xmlns:dgm="http://schemas.openxmlformats.org/drawingml/2006/diagram" xmlns:r="http://schemas.openxmlformats.org/officeDocument/2006/relationships" r:dm="rId3" r:lo="rId4" r:qs="rId5" r:cs="rId6"/>
+          </a:graphicData>
+        </a:graphic>
+      </p:graphicFrame>
+      <p:sp>
+        <p:nvSpPr>
+          <p:cNvPr id="3" name="TextBox 2">
+            <a:extLst>
+              <a:ext uri="{FF2B5EF4-FFF2-40B4-BE49-F238E27FC236}">
+                <a16:creationId xmlns:a16="http://schemas.microsoft.com/office/drawing/2014/main" id="{FD6EAA75-C94E-4445-AD1B-F468B33665DD}"/>
+              </a:ext>
+            </a:extLst>
+          </p:cNvPr>
+          <p:cNvSpPr txBox="1"/>
+          <p:nvPr/>
+        </p:nvSpPr>
+        <p:spPr>
+          <a:xfrm>
+            <a:off x="3929807" y="5170970"/>
+            <a:ext cx="3962400" cy="646331"/>
+          </a:xfrm>
+          <a:prstGeom prst="rect">
+            <a:avLst/>
+          </a:prstGeom>
+          <a:noFill/>
+        </p:spPr>
+        <p:txBody>
+          <a:bodyPr wrap="square" rtlCol="0">
+            <a:spAutoFit/>
+          </a:bodyPr>
+          <a:lstStyle/>
+          <a:p>
+            <a:pPr lvl="0"/>
+            <a:r>
+              <a:rPr lang="en-US" dirty="0"/>
+              <a:t>R</a:t>
+            </a:r>
+            <a:r>
+              <a:rPr lang="en-US" sz="1800" dirty="0"/>
+              <a:t>eact to unforeseen issues like a child running in front of the car quickly.</a:t>
+            </a:r>
+            <a:endParaRPr lang="en-US" dirty="0"/>
+          </a:p>
+        </p:txBody>
+      </p:sp>
+      <p:sp>
+        <p:nvSpPr>
+          <p:cNvPr id="6" name="TextBox 5">
+            <a:extLst>
+              <a:ext uri="{FF2B5EF4-FFF2-40B4-BE49-F238E27FC236}">
+                <a16:creationId xmlns:a16="http://schemas.microsoft.com/office/drawing/2014/main" id="{2D499C2C-DA7C-4702-8951-9F3A8E6E1800}"/>
+              </a:ext>
+            </a:extLst>
+          </p:cNvPr>
+          <p:cNvSpPr txBox="1"/>
+          <p:nvPr/>
+        </p:nvSpPr>
+        <p:spPr>
+          <a:xfrm>
+            <a:off x="3933926" y="3058805"/>
+            <a:ext cx="5137400" cy="646331"/>
+          </a:xfrm>
+          <a:prstGeom prst="rect">
+            <a:avLst/>
+          </a:prstGeom>
+          <a:noFill/>
+        </p:spPr>
+        <p:txBody>
+          <a:bodyPr wrap="square" rtlCol="0">
+            <a:spAutoFit/>
+          </a:bodyPr>
+          <a:lstStyle/>
+          <a:p>
+            <a:pPr lvl="0"/>
+            <a:r>
+              <a:rPr lang="en-US" sz="1800" dirty="0"/>
+              <a:t>Make sure the passenger has a pleasant drive (not too much sudden breaking = utility)</a:t>
+            </a:r>
+          </a:p>
+        </p:txBody>
+      </p:sp>
+      <p:sp>
+        <p:nvSpPr>
+          <p:cNvPr id="7" name="TextBox 6">
+            <a:extLst>
+              <a:ext uri="{FF2B5EF4-FFF2-40B4-BE49-F238E27FC236}">
+                <a16:creationId xmlns:a16="http://schemas.microsoft.com/office/drawing/2014/main" id="{9AC301F9-4D8F-484A-8F4D-6A05CB5B419A}"/>
+              </a:ext>
+            </a:extLst>
+          </p:cNvPr>
+          <p:cNvSpPr txBox="1"/>
+          <p:nvPr/>
+        </p:nvSpPr>
+        <p:spPr>
+          <a:xfrm>
+            <a:off x="3929806" y="3907091"/>
+            <a:ext cx="3550150" cy="369332"/>
+          </a:xfrm>
+          <a:prstGeom prst="rect">
+            <a:avLst/>
+          </a:prstGeom>
+          <a:noFill/>
+        </p:spPr>
+        <p:txBody>
+          <a:bodyPr wrap="square" rtlCol="0">
+            <a:spAutoFit/>
+          </a:bodyPr>
+          <a:lstStyle/>
+          <a:p>
+            <a:pPr lvl="0"/>
+            <a:r>
+              <a:rPr lang="en-US" sz="1800" dirty="0"/>
+              <a:t>Plan the route to the destination.</a:t>
+            </a:r>
+          </a:p>
+        </p:txBody>
+      </p:sp>
+      <p:sp>
+        <p:nvSpPr>
+          <p:cNvPr id="8" name="Rectangle 7">
+            <a:extLst>
+              <a:ext uri="{FF2B5EF4-FFF2-40B4-BE49-F238E27FC236}">
+                <a16:creationId xmlns:a16="http://schemas.microsoft.com/office/drawing/2014/main" id="{012AFA01-1466-4DBF-AA3A-9AF70B436486}"/>
+              </a:ext>
+            </a:extLst>
+          </p:cNvPr>
+          <p:cNvSpPr/>
+          <p:nvPr/>
+        </p:nvSpPr>
+        <p:spPr>
+          <a:xfrm rot="16200000">
+            <a:off x="-266448" y="4297612"/>
+            <a:ext cx="2818899" cy="457200"/>
+          </a:xfrm>
+          <a:prstGeom prst="rect">
+            <a:avLst/>
+          </a:prstGeom>
+          <a:solidFill>
+            <a:srgbClr val="FFFFFF">
+              <a:alpha val="80000"/>
+            </a:srgbClr>
+          </a:solidFill>
+        </p:spPr>
+        <p:style>
+          <a:lnRef idx="2">
+            <a:schemeClr val="accent1"/>
+          </a:lnRef>
+          <a:fillRef idx="1">
+            <a:schemeClr val="lt1"/>
+          </a:fillRef>
+          <a:effectRef idx="0">
+            <a:schemeClr val="accent1"/>
+          </a:effectRef>
+          <a:fontRef idx="minor">
+            <a:schemeClr val="dk1"/>
+          </a:fontRef>
+        </p:style>
+        <p:txBody>
+          <a:bodyPr rtlCol="0" anchor="ctr"/>
+          <a:lstStyle/>
+          <a:p>
+            <a:pPr algn="ctr"/>
+            <a:r>
+              <a:rPr lang="en-US" sz="2000" dirty="0"/>
+              <a:t>It should learn!</a:t>
+            </a:r>
+          </a:p>
+        </p:txBody>
+      </p:sp>
+      <p:pic>
+        <p:nvPicPr>
+          <p:cNvPr id="5" name="Picture 2" descr="See the source image">
+            <a:extLst>
+              <a:ext uri="{FF2B5EF4-FFF2-40B4-BE49-F238E27FC236}">
+                <a16:creationId xmlns:a16="http://schemas.microsoft.com/office/drawing/2014/main" id="{2E922884-3303-24F6-3C7C-5BBCF646CEC4}"/>
+              </a:ext>
+            </a:extLst>
+          </p:cNvPr>
+          <p:cNvPicPr>
+            <a:picLocks noChangeAspect="1" noChangeArrowheads="1"/>
+          </p:cNvPicPr>
+          <p:nvPr/>
+        </p:nvPicPr>
+        <p:blipFill rotWithShape="1">
+          <a:blip r:embed="rId8" cstate="print">
+            <a:extLst>
+              <a:ext uri="{28A0092B-C50C-407E-A947-70E740481C1C}">
+                <a14:useLocalDpi xmlns:a14="http://schemas.microsoft.com/office/drawing/2010/main" val="0"/>
+              </a:ext>
+            </a:extLst>
+          </a:blip>
+          <a:srcRect r="38945" b="37618"/>
+          <a:stretch/>
+        </p:blipFill>
+        <p:spPr bwMode="auto">
+          <a:xfrm>
+            <a:off x="4757194" y="258804"/>
+            <a:ext cx="4114800" cy="2364873"/>
+          </a:xfrm>
+          <a:prstGeom prst="rect">
+            <a:avLst/>
+          </a:prstGeom>
+          <a:ln>
+            <a:noFill/>
+          </a:ln>
+          <a:effectLst>
+            <a:outerShdw blurRad="292100" dist="139700" dir="2700000" algn="tl" rotWithShape="0">
+              <a:srgbClr val="333333">
+                <a:alpha val="65000"/>
+              </a:srgbClr>
+            </a:outerShdw>
+          </a:effectLst>
+          <a:extLst>
+            <a:ext uri="{909E8E84-426E-40DD-AFC4-6F175D3DCCD1}">
+              <a14:hiddenFill xmlns:a14="http://schemas.microsoft.com/office/drawing/2010/main">
+                <a:solidFill>
+                  <a:srgbClr val="FFFFFF"/>
+                </a:solidFill>
+              </a14:hiddenFill>
+            </a:ext>
+          </a:extLst>
+        </p:spPr>
+      </p:pic>
+      <p:sp>
+        <p:nvSpPr>
+          <p:cNvPr id="9" name="TextBox 8">
+            <a:extLst>
+              <a:ext uri="{FF2B5EF4-FFF2-40B4-BE49-F238E27FC236}">
+                <a16:creationId xmlns:a16="http://schemas.microsoft.com/office/drawing/2014/main" id="{FD8E073D-E3E3-3462-E5CB-9681F2508B4E}"/>
+              </a:ext>
+            </a:extLst>
+          </p:cNvPr>
+          <p:cNvSpPr txBox="1"/>
+          <p:nvPr/>
+        </p:nvSpPr>
+        <p:spPr>
+          <a:xfrm>
+            <a:off x="3929806" y="4459494"/>
+            <a:ext cx="4923653" cy="646331"/>
+          </a:xfrm>
+          <a:prstGeom prst="rect">
+            <a:avLst/>
+          </a:prstGeom>
+          <a:noFill/>
+        </p:spPr>
+        <p:txBody>
+          <a:bodyPr wrap="square" rtlCol="0">
+            <a:spAutoFit/>
+          </a:bodyPr>
+          <a:lstStyle/>
+          <a:p>
+            <a:pPr lvl="0"/>
+            <a:r>
+              <a:rPr lang="en-US" dirty="0"/>
+              <a:t>Remember where every other car is and calculate where they will be in the next few seconds.</a:t>
+            </a:r>
+          </a:p>
+        </p:txBody>
+      </p:sp>
+    </p:spTree>
+    <p:extLst>
+      <p:ext uri="{BB962C8B-B14F-4D97-AF65-F5344CB8AC3E}">
+        <p14:creationId xmlns:p14="http://schemas.microsoft.com/office/powerpoint/2010/main" val="1386669801"/>
+      </p:ext>
+    </p:extLst>
+  </p:cSld>
+  <p:clrMapOvr>
+    <a:masterClrMapping/>
+  </p:clrMapOvr>
+</p:sld>
+</file>
+
+<file path=ppt/slides/slide35.xml><?xml version="1.0" encoding="utf-8"?>
 <p:sld xmlns:a="http://schemas.openxmlformats.org/drawingml/2006/main" xmlns:r="http://schemas.openxmlformats.org/officeDocument/2006/relationships" xmlns:p="http://schemas.openxmlformats.org/presentationml/2006/main">
   <p:cSld>
     <p:spTree>
@@ -56822,8 +59878,8 @@
           </a:p>
         </p:txBody>
       </p:sp>
-      <mc:AlternateContent xmlns:mc="http://schemas.openxmlformats.org/markup-compatibility/2006">
-        <mc:Choice xmlns:a14="http://schemas.microsoft.com/office/drawing/2010/main" Requires="a14">
+      <mc:AlternateContent xmlns:mc="http://schemas.openxmlformats.org/markup-compatibility/2006" xmlns:a14="http://schemas.microsoft.com/office/drawing/2010/main">
+        <mc:Choice Requires="a14">
           <p:sp>
             <p:nvSpPr>
               <p:cNvPr id="6147" name="Rectangle 3"/>
@@ -57075,7 +60131,7 @@
             </p:txBody>
           </p:sp>
         </mc:Choice>
-        <mc:Fallback>
+        <mc:Fallback xmlns="">
           <p:sp>
             <p:nvSpPr>
               <p:cNvPr id="6147" name="Rectangle 3"/>

</xml_diff>